<commit_message>
Add title page with authors and course information
</commit_message>
<xml_diff>
--- a/FINAL_PRESENTATION.pptx
+++ b/FINAL_PRESENTATION.pptx
@@ -36,7 +36,6 @@
     <p:sldId id="284" r:id="rId30"/>
     <p:sldId id="285" r:id="rId31"/>
     <p:sldId id="286" r:id="rId32"/>
-    <p:sldId id="287" r:id="rId33"/>
   </p:sldIdLst>
   <p:sldSz cx="9144000" cy="5143500" type="screen16x9"/>
   <p:notesSz cx="6858000" cy="9144000"/>
@@ -3146,7 +3145,7 @@
             </a:pPr>
             <a:r>
               <a:rPr/>
-              <a:t>ABB IRB1600 Robot Simulation Project</a:t>
+              <a:t>The Robot Motion Kernel</a:t>
             </a:r>
           </a:p>
         </p:txBody>
@@ -3157,287 +3156,6 @@
 </file>
 
 <file path=ppt/slides/slide10.xml><?xml version="1.0" encoding="utf-8"?>
-<p:sld xmlns:a="http://schemas.openxmlformats.org/drawingml/2006/main" xmlns:r="http://schemas.openxmlformats.org/officeDocument/2006/relationships" xmlns:p="http://schemas.openxmlformats.org/presentationml/2006/main">
-  <p:cSld>
-    <p:spTree>
-      <p:nvGrpSpPr>
-        <p:cNvPr id="1" name=""/>
-        <p:cNvGrpSpPr/>
-        <p:nvPr/>
-      </p:nvGrpSpPr>
-      <p:grpSpPr>
-        <a:xfrm>
-          <a:off x="0" y="0"/>
-          <a:ext cx="0" cy="0"/>
-          <a:chOff x="0" y="0"/>
-          <a:chExt cx="0" cy="0"/>
-        </a:xfrm>
-      </p:grpSpPr>
-      <p:sp>
-        <p:nvSpPr>
-          <p:cNvPr id="4" name="Text Placeholder 3"/>
-          <p:cNvSpPr>
-            <a:spLocks noGrp="1"/>
-          </p:cNvSpPr>
-          <p:nvPr>
-            <p:ph idx="2" sz="half" type="body"/>
-          </p:nvPr>
-        </p:nvSpPr>
-        <p:spPr/>
-        <p:txBody>
-          <a:bodyPr/>
-          <a:lstStyle/>
-          <a:p>
-            <a:pPr lvl="0" indent="0" marL="0">
-              <a:buNone/>
-            </a:pPr>
-            <a:r>
-              <a:rPr/>
-              <a:t> </a:t>
-            </a:r>
-            <a:r>
-              <a:rPr b="1"/>
-              <a:t>Figure 3</a:t>
-            </a:r>
-            <a:r>
-              <a:rPr/>
-              <a:t>: </a:t>
-            </a:r>
-            <a:r>
-              <a:rPr i="1"/>
-              <a:t>Complete test suite showing 100% pass rate. All mathematical properties verified: identity quaternion, 90° rotations, robot-specific quaternions, and unnormalized inputs all handled correctly.</a:t>
-            </a:r>
-          </a:p>
-          <a:p>
-            <a:pPr lvl="0" indent="0" marL="0">
-              <a:buNone/>
-            </a:pPr>
-            <a:r>
-              <a:rPr b="1"/>
-              <a:t>Test Coverage:</a:t>
-            </a:r>
-            <a:r>
-              <a:rPr/>
-              <a:t> - ✅ Identity quaternion: [1,0,0,0] → I₃ - ✅ 90° Z-rotation: Verified against known result - ✅ Robot quaternions: From actual RAPID targets - ✅ Unnormalized inputs: Automatic normalization - ✅ Determinant validation: det(R) = 1.0 ± 10⁻¹⁶ - ✅ Orthogonality: R’R = I within machine precision</a:t>
-            </a:r>
-          </a:p>
-          <a:p>
-            <a:pPr lvl="0" indent="0" marL="0">
-              <a:spcBef>
-                <a:spcPts val="3000"/>
-              </a:spcBef>
-              <a:buNone/>
-            </a:pPr>
-            <a:r>
-              <a:rPr b="1"/>
-              <a:t>2.2 Phase 2: SLERP Interpolation</a:t>
-            </a:r>
-          </a:p>
-          <a:p>
-            <a:pPr lvl="0" indent="0" marL="0">
-              <a:spcBef>
-                <a:spcPts val="3000"/>
-              </a:spcBef>
-              <a:buNone/>
-            </a:pPr>
-            <a:r>
-              <a:rPr b="1"/>
-              <a:t>2.2.1 Why SLERP Matters</a:t>
-            </a:r>
-          </a:p>
-          <a:p>
-            <a:pPr lvl="0" indent="0" marL="0">
-              <a:buNone/>
-            </a:pPr>
-            <a:r>
-              <a:rPr/>
-              <a:t>Linear interpolation of quaternions causes: - </a:t>
-            </a:r>
-            <a:r>
-              <a:rPr b="1"/>
-              <a:t>Non-constant angular velocity</a:t>
-            </a:r>
-            <a:r>
-              <a:rPr/>
-              <a:t> (jerky motion) - </a:t>
-            </a:r>
-            <a:r>
-              <a:rPr b="1"/>
-              <a:t>Unnatural paths</a:t>
-            </a:r>
-            <a:r>
-              <a:rPr/>
-              <a:t> (deviation from geodesic) - </a:t>
-            </a:r>
-            <a:r>
-              <a:rPr b="1"/>
-              <a:t>Quaternion denormalization</a:t>
-            </a:r>
-            <a:r>
-              <a:rPr/>
-              <a:t> (invalid rotations)</a:t>
-            </a:r>
-          </a:p>
-          <a:p>
-            <a:pPr lvl="0" indent="0" marL="0">
-              <a:buNone/>
-            </a:pPr>
-            <a:r>
-              <a:rPr/>
-              <a:t>Spherical Linear Interpolation (SLERP) provides: - </a:t>
-            </a:r>
-            <a:r>
-              <a:rPr b="1"/>
-              <a:t>Constant angular velocity</a:t>
-            </a:r>
-            <a:r>
-              <a:rPr/>
-              <a:t> (smooth motion) - </a:t>
-            </a:r>
-            <a:r>
-              <a:rPr b="1"/>
-              <a:t>Shortest path</a:t>
-            </a:r>
-            <a:r>
-              <a:rPr/>
-              <a:t> on the quaternion sphere - </a:t>
-            </a:r>
-            <a:r>
-              <a:rPr b="1"/>
-              <a:t>Preserved normalization</a:t>
-            </a:r>
-            <a:r>
-              <a:rPr/>
-              <a:t> (always unit quaternion)</a:t>
-            </a:r>
-          </a:p>
-          <a:p>
-            <a:pPr lvl="0" indent="0" marL="0">
-              <a:spcBef>
-                <a:spcPts val="3000"/>
-              </a:spcBef>
-              <a:buNone/>
-            </a:pPr>
-            <a:r>
-              <a:rPr b="1"/>
-              <a:t>2.2.2 SLERP Mathematics</a:t>
-            </a:r>
-          </a:p>
-          <a:p>
-            <a:pPr lvl="0" indent="0" marL="0">
-              <a:buNone/>
-            </a:pPr>
-            <a:r>
-              <a:rPr/>
-              <a:t>Given two unit quaternions </a:t>
-            </a:r>
-            <a:r>
-              <a:rPr b="1"/>
-              <a:t>q₁</a:t>
-            </a:r>
-            <a:r>
-              <a:rPr/>
-              <a:t> and </a:t>
-            </a:r>
-            <a:r>
-              <a:rPr b="1"/>
-              <a:t>q₂</a:t>
-            </a:r>
-            <a:r>
-              <a:rPr/>
-              <a:t>, SLERP interpolates as:</a:t>
-            </a:r>
-          </a:p>
-          <a:p>
-            <a:pPr lvl="0" indent="0">
-              <a:buNone/>
-            </a:pPr>
-            <a:r>
-              <a:rPr>
-                <a:latin typeface="Courier"/>
-              </a:rPr>
-              <a:t>SLERP(q₁, q₂, t) = [sin((1-t)θ)/sin(θ)] × q₁ + [sin(tθ)/sin(θ)] × q₂</a:t>
-            </a:r>
-          </a:p>
-          <a:p>
-            <a:pPr lvl="0" indent="0" marL="0">
-              <a:buNone/>
-            </a:pPr>
-            <a:r>
-              <a:rPr/>
-              <a:t>where θ = arccos(q₁ · q₂) is the angle between quaternions.</a:t>
-            </a:r>
-          </a:p>
-        </p:txBody>
-      </p:sp>
-      <p:pic>
-        <p:nvPicPr>
-          <p:cNvPr descr="figures/fig5_slerp_comparison.png" id="0" name="Picture 1"/>
-          <p:cNvPicPr>
-            <a:picLocks noGrp="1" noChangeAspect="1"/>
-          </p:cNvPicPr>
-          <p:nvPr/>
-        </p:nvPicPr>
-        <p:blipFill>
-          <a:blip r:embed="rId2"/>
-          <a:stretch>
-            <a:fillRect/>
-          </a:stretch>
-        </p:blipFill>
-        <p:spPr bwMode="auto">
-          <a:xfrm>
-            <a:off x="3632200" y="203200"/>
-            <a:ext cx="4978400" cy="3873500"/>
-          </a:xfrm>
-          <a:prstGeom prst="rect">
-            <a:avLst/>
-          </a:prstGeom>
-          <a:noFill/>
-          <a:ln w="9525">
-            <a:noFill/>
-            <a:headEnd/>
-            <a:tailEnd/>
-          </a:ln>
-        </p:spPr>
-      </p:pic>
-      <p:sp>
-        <p:nvSpPr>
-          <p:cNvPr id="1" name="TextBox 3"/>
-          <p:cNvSpPr txBox="1"/>
-          <p:nvPr>
-            <p:ph idx="1"/>
-          </p:nvPr>
-        </p:nvSpPr>
-        <p:spPr>
-          <a:xfrm>
-            <a:off x="3568700" y="4076700"/>
-            <a:ext cx="5105400" cy="508000"/>
-          </a:xfrm>
-          <a:prstGeom prst="rect">
-            <a:avLst/>
-          </a:prstGeom>
-          <a:noFill/>
-        </p:spPr>
-        <p:txBody>
-          <a:bodyPr/>
-          <a:lstStyle/>
-          <a:p>
-            <a:pPr lvl="0" indent="0" marL="0" algn="ctr">
-              <a:buNone/>
-            </a:pPr>
-            <a:r>
-              <a:rPr/>
-              <a:t>Figure 5: SLERP vs Linear Interpolation Comparison</a:t>
-            </a:r>
-          </a:p>
-        </p:txBody>
-      </p:sp>
-    </p:spTree>
-  </p:cSld>
-</p:sld>
-</file>
-
-<file path=ppt/slides/slide11.xml><?xml version="1.0" encoding="utf-8"?>
 <p:sld xmlns:a="http://schemas.openxmlformats.org/drawingml/2006/main" xmlns:r="http://schemas.openxmlformats.org/officeDocument/2006/relationships" xmlns:p="http://schemas.openxmlformats.org/presentationml/2006/main">
   <p:cSld>
     <p:spTree>
@@ -4750,7 +4468,7 @@
 </p:sld>
 </file>
 
-<file path=ppt/slides/slide12.xml><?xml version="1.0" encoding="utf-8"?>
+<file path=ppt/slides/slide11.xml><?xml version="1.0" encoding="utf-8"?>
 <p:sld xmlns:a="http://schemas.openxmlformats.org/drawingml/2006/main" xmlns:r="http://schemas.openxmlformats.org/officeDocument/2006/relationships" xmlns:p="http://schemas.openxmlformats.org/presentationml/2006/main">
   <p:cSld>
     <p:spTree>
@@ -4982,7 +4700,7 @@
 </p:sld>
 </file>
 
-<file path=ppt/slides/slide13.xml><?xml version="1.0" encoding="utf-8"?>
+<file path=ppt/slides/slide12.xml><?xml version="1.0" encoding="utf-8"?>
 <p:sld xmlns:a="http://schemas.openxmlformats.org/drawingml/2006/main" xmlns:r="http://schemas.openxmlformats.org/officeDocument/2006/relationships" xmlns:p="http://schemas.openxmlformats.org/presentationml/2006/main">
   <p:cSld>
     <p:spTree>
@@ -5156,7 +4874,7 @@
 </p:sld>
 </file>
 
-<file path=ppt/slides/slide14.xml><?xml version="1.0" encoding="utf-8"?>
+<file path=ppt/slides/slide13.xml><?xml version="1.0" encoding="utf-8"?>
 <p:sld xmlns:a="http://schemas.openxmlformats.org/drawingml/2006/main" xmlns:r="http://schemas.openxmlformats.org/officeDocument/2006/relationships" xmlns:p="http://schemas.openxmlformats.org/presentationml/2006/main">
   <p:cSld>
     <p:spTree>
@@ -5335,7 +5053,7 @@
 </p:sld>
 </file>
 
-<file path=ppt/slides/slide15.xml><?xml version="1.0" encoding="utf-8"?>
+<file path=ppt/slides/slide14.xml><?xml version="1.0" encoding="utf-8"?>
 <p:sld xmlns:a="http://schemas.openxmlformats.org/drawingml/2006/main" xmlns:r="http://schemas.openxmlformats.org/officeDocument/2006/relationships" xmlns:p="http://schemas.openxmlformats.org/presentationml/2006/main">
   <p:cSld>
     <p:spTree>
@@ -5485,7 +5203,7 @@
 </p:sld>
 </file>
 
-<file path=ppt/slides/slide16.xml><?xml version="1.0" encoding="utf-8"?>
+<file path=ppt/slides/slide15.xml><?xml version="1.0" encoding="utf-8"?>
 <p:sld xmlns:a="http://schemas.openxmlformats.org/drawingml/2006/main" xmlns:r="http://schemas.openxmlformats.org/officeDocument/2006/relationships" xmlns:p="http://schemas.openxmlformats.org/presentationml/2006/main">
   <p:cSld>
     <p:spTree>
@@ -5636,7 +5354,7 @@
 </p:sld>
 </file>
 
-<file path=ppt/slides/slide17.xml><?xml version="1.0" encoding="utf-8"?>
+<file path=ppt/slides/slide16.xml><?xml version="1.0" encoding="utf-8"?>
 <p:sld xmlns:a="http://schemas.openxmlformats.org/drawingml/2006/main" xmlns:r="http://schemas.openxmlformats.org/officeDocument/2006/relationships" xmlns:p="http://schemas.openxmlformats.org/presentationml/2006/main">
   <p:cSld>
     <p:spTree>
@@ -6078,7 +5796,7 @@
 </p:sld>
 </file>
 
-<file path=ppt/slides/slide18.xml><?xml version="1.0" encoding="utf-8"?>
+<file path=ppt/slides/slide17.xml><?xml version="1.0" encoding="utf-8"?>
 <p:sld xmlns:a="http://schemas.openxmlformats.org/drawingml/2006/main" xmlns:r="http://schemas.openxmlformats.org/officeDocument/2006/relationships" xmlns:p="http://schemas.openxmlformats.org/presentationml/2006/main">
   <p:cSld>
     <p:spTree>
@@ -6722,7 +6440,7 @@
 </p:sld>
 </file>
 
-<file path=ppt/slides/slide19.xml><?xml version="1.0" encoding="utf-8"?>
+<file path=ppt/slides/slide18.xml><?xml version="1.0" encoding="utf-8"?>
 <p:sld xmlns:a="http://schemas.openxmlformats.org/drawingml/2006/main" xmlns:r="http://schemas.openxmlformats.org/officeDocument/2006/relationships" xmlns:p="http://schemas.openxmlformats.org/presentationml/2006/main">
   <p:cSld>
     <p:spTree>
@@ -11799,54 +11517,7 @@
 </p:sld>
 </file>
 
-<file path=ppt/slides/slide2.xml><?xml version="1.0" encoding="utf-8"?>
-<p:sld xmlns:a="http://schemas.openxmlformats.org/drawingml/2006/main" xmlns:r="http://schemas.openxmlformats.org/officeDocument/2006/relationships" xmlns:p="http://schemas.openxmlformats.org/presentationml/2006/main">
-  <p:cSld>
-    <p:spTree>
-      <p:nvGrpSpPr>
-        <p:cNvPr id="1" name=""/>
-        <p:cNvGrpSpPr/>
-        <p:nvPr/>
-      </p:nvGrpSpPr>
-      <p:grpSpPr>
-        <a:xfrm>
-          <a:off x="0" y="0"/>
-          <a:ext cx="0" cy="0"/>
-          <a:chOff x="0" y="0"/>
-          <a:chExt cx="0" cy="0"/>
-        </a:xfrm>
-      </p:grpSpPr>
-      <p:sp>
-        <p:nvSpPr>
-          <p:cNvPr id="2" name="Title 1"/>
-          <p:cNvSpPr>
-            <a:spLocks noGrp="1"/>
-          </p:cNvSpPr>
-          <p:nvPr>
-            <p:ph type="title"/>
-          </p:nvPr>
-        </p:nvSpPr>
-        <p:spPr/>
-        <p:txBody>
-          <a:bodyPr/>
-          <a:lstStyle/>
-          <a:p>
-            <a:pPr lvl="0" indent="0" marL="0">
-              <a:buNone/>
-            </a:pPr>
-            <a:r>
-              <a:rPr/>
-              <a:t>Complete Implementation Report with Visual Documentation</a:t>
-            </a:r>
-          </a:p>
-        </p:txBody>
-      </p:sp>
-    </p:spTree>
-  </p:cSld>
-</p:sld>
-</file>
-
-<file path=ppt/slides/slide20.xml><?xml version="1.0" encoding="utf-8"?>
+<file path=ppt/slides/slide19.xml><?xml version="1.0" encoding="utf-8"?>
 <p:sld xmlns:a="http://schemas.openxmlformats.org/drawingml/2006/main" xmlns:r="http://schemas.openxmlformats.org/officeDocument/2006/relationships" xmlns:p="http://schemas.openxmlformats.org/presentationml/2006/main">
   <p:cSld>
     <p:spTree>
@@ -11988,7 +11659,122 @@
 </p:sld>
 </file>
 
-<file path=ppt/slides/slide21.xml><?xml version="1.0" encoding="utf-8"?>
+<file path=ppt/slides/slide2.xml><?xml version="1.0" encoding="utf-8"?>
+<p:sld xmlns:a="http://schemas.openxmlformats.org/drawingml/2006/main" xmlns:r="http://schemas.openxmlformats.org/officeDocument/2006/relationships" xmlns:p="http://schemas.openxmlformats.org/presentationml/2006/main">
+  <p:cSld>
+    <p:spTree>
+      <p:nvGrpSpPr>
+        <p:cNvPr id="1" name=""/>
+        <p:cNvGrpSpPr/>
+        <p:nvPr/>
+      </p:nvGrpSpPr>
+      <p:grpSpPr>
+        <a:xfrm>
+          <a:off x="0" y="0"/>
+          <a:ext cx="0" cy="0"/>
+          <a:chOff x="0" y="0"/>
+          <a:chExt cx="0" cy="0"/>
+        </a:xfrm>
+      </p:grpSpPr>
+      <p:sp>
+        <p:nvSpPr>
+          <p:cNvPr id="3" name="Content Placeholder 2"/>
+          <p:cNvSpPr>
+            <a:spLocks noGrp="1"/>
+          </p:cNvSpPr>
+          <p:nvPr>
+            <p:ph idx="1"/>
+          </p:nvPr>
+        </p:nvSpPr>
+        <p:spPr/>
+        <p:txBody>
+          <a:bodyPr/>
+          <a:lstStyle/>
+          <a:p>
+            <a:pPr lvl="0" indent="0" marL="0">
+              <a:buNone/>
+            </a:pPr>
+            <a:r>
+              <a:rPr b="1"/>
+              <a:t>Authors</a:t>
+            </a:r>
+            <a:r>
+              <a:rPr/>
+              <a:t>:</a:t>
+            </a:r>
+            <a:br/>
+            <a:r>
+              <a:rPr/>
+              <a:t>Jinsha Anna Antony</a:t>
+            </a:r>
+            <a:br/>
+            <a:r>
+              <a:rPr/>
+              <a:t>Katherine Rajala</a:t>
+            </a:r>
+            <a:br/>
+            <a:r>
+              <a:rPr/>
+              <a:t>Abhishek Kumar</a:t>
+            </a:r>
+          </a:p>
+          <a:p>
+            <a:pPr lvl="0" indent="0" marL="0">
+              <a:buNone/>
+            </a:pPr>
+            <a:r>
+              <a:rPr b="1"/>
+              <a:t>Course</a:t>
+            </a:r>
+            <a:r>
+              <a:rPr/>
+              <a:t>: Robot Modelling</a:t>
+            </a:r>
+            <a:br/>
+            <a:r>
+              <a:rPr b="1"/>
+              <a:t>Institution</a:t>
+            </a:r>
+            <a:r>
+              <a:rPr/>
+              <a:t>: University of West Sweden, Trollhättan</a:t>
+            </a:r>
+            <a:br/>
+            <a:r>
+              <a:rPr b="1"/>
+              <a:t>Date</a:t>
+            </a:r>
+            <a:r>
+              <a:rPr/>
+              <a:t>: January 15, 2026</a:t>
+            </a:r>
+            <a:br/>
+            <a:r>
+              <a:rPr b="1"/>
+              <a:t>Project</a:t>
+            </a:r>
+            <a:r>
+              <a:rPr/>
+              <a:t>: RMB600 Mini Project - ABB IRB1600 Robot Simulation</a:t>
+            </a:r>
+            <a:br/>
+            <a:r>
+              <a:rPr b="1"/>
+              <a:t>Repository</a:t>
+            </a:r>
+            <a:r>
+              <a:rPr/>
+              <a:t>: github.com/abhi-mdu/RMB600_mini_project</a:t>
+            </a:r>
+          </a:p>
+        </p:txBody>
+      </p:sp>
+    </p:spTree>
+  </p:cSld>
+</p:sld>
+</file>
+
+<file path=ppt/slides/slide20.xml><?xml version="1.0" encoding="utf-8"?>
 <p:sld xmlns:a="http://schemas.openxmlformats.org/drawingml/2006/main" xmlns:r="http://schemas.openxmlformats.org/officeDocument/2006/relationships" xmlns:p="http://schemas.openxmlformats.org/presentationml/2006/main">
   <p:cSld>
     <p:spTree>
@@ -12462,7 +12248,7 @@
 </p:sld>
 </file>
 
-<file path=ppt/slides/slide22.xml><?xml version="1.0" encoding="utf-8"?>
+<file path=ppt/slides/slide21.xml><?xml version="1.0" encoding="utf-8"?>
 <p:sld xmlns:a="http://schemas.openxmlformats.org/drawingml/2006/main" xmlns:r="http://schemas.openxmlformats.org/officeDocument/2006/relationships" xmlns:p="http://schemas.openxmlformats.org/presentationml/2006/main">
   <p:cSld>
     <p:spTree>
@@ -13182,7 +12968,7 @@
 </p:sld>
 </file>
 
-<file path=ppt/slides/slide23.xml><?xml version="1.0" encoding="utf-8"?>
+<file path=ppt/slides/slide22.xml><?xml version="1.0" encoding="utf-8"?>
 <p:sld xmlns:a="http://schemas.openxmlformats.org/drawingml/2006/main" xmlns:r="http://schemas.openxmlformats.org/officeDocument/2006/relationships" xmlns:p="http://schemas.openxmlformats.org/presentationml/2006/main">
   <p:cSld>
     <p:spTree>
@@ -15391,7 +15177,7 @@
 </p:sld>
 </file>
 
-<file path=ppt/slides/slide24.xml><?xml version="1.0" encoding="utf-8"?>
+<file path=ppt/slides/slide23.xml><?xml version="1.0" encoding="utf-8"?>
 <p:sld xmlns:a="http://schemas.openxmlformats.org/drawingml/2006/main" xmlns:r="http://schemas.openxmlformats.org/officeDocument/2006/relationships" xmlns:p="http://schemas.openxmlformats.org/presentationml/2006/main">
   <p:cSld>
     <p:spTree>
@@ -16196,7 +15982,7 @@
 </p:sld>
 </file>
 
-<file path=ppt/slides/slide25.xml><?xml version="1.0" encoding="utf-8"?>
+<file path=ppt/slides/slide24.xml><?xml version="1.0" encoding="utf-8"?>
 <p:sld xmlns:a="http://schemas.openxmlformats.org/drawingml/2006/main" xmlns:r="http://schemas.openxmlformats.org/officeDocument/2006/relationships" xmlns:p="http://schemas.openxmlformats.org/presentationml/2006/main">
   <p:cSld>
     <p:spTree>
@@ -16287,7 +16073,7 @@
 </p:sld>
 </file>
 
-<file path=ppt/slides/slide26.xml><?xml version="1.0" encoding="utf-8"?>
+<file path=ppt/slides/slide25.xml><?xml version="1.0" encoding="utf-8"?>
 <p:sld xmlns:a="http://schemas.openxmlformats.org/drawingml/2006/main" xmlns:r="http://schemas.openxmlformats.org/officeDocument/2006/relationships" xmlns:p="http://schemas.openxmlformats.org/presentationml/2006/main">
   <p:cSld>
     <p:spTree>
@@ -16955,7 +16741,7 @@
 </p:sld>
 </file>
 
-<file path=ppt/slides/slide27.xml><?xml version="1.0" encoding="utf-8"?>
+<file path=ppt/slides/slide26.xml><?xml version="1.0" encoding="utf-8"?>
 <p:sld xmlns:a="http://schemas.openxmlformats.org/drawingml/2006/main" xmlns:r="http://schemas.openxmlformats.org/officeDocument/2006/relationships" xmlns:p="http://schemas.openxmlformats.org/presentationml/2006/main">
   <p:cSld>
     <p:spTree>
@@ -17164,6 +16950,478 @@
             <a:r>
               <a:rPr/>
               <a:t> - Demonstrates academic understanding of industrial requirements - Shows potential for MATLAB-based robot simulation - Validates conversion methodologies for legacy code migration</a:t>
+            </a:r>
+          </a:p>
+        </p:txBody>
+      </p:sp>
+    </p:spTree>
+  </p:cSld>
+</p:sld>
+</file>
+
+<file path=ppt/slides/slide27.xml><?xml version="1.0" encoding="utf-8"?>
+<p:sld xmlns:a="http://schemas.openxmlformats.org/drawingml/2006/main" xmlns:r="http://schemas.openxmlformats.org/officeDocument/2006/relationships" xmlns:p="http://schemas.openxmlformats.org/presentationml/2006/main">
+  <p:cSld>
+    <p:spTree>
+      <p:nvGrpSpPr>
+        <p:cNvPr id="1" name=""/>
+        <p:cNvGrpSpPr/>
+        <p:nvPr/>
+      </p:nvGrpSpPr>
+      <p:grpSpPr>
+        <a:xfrm>
+          <a:off x="0" y="0"/>
+          <a:ext cx="0" cy="0"/>
+          <a:chOff x="0" y="0"/>
+          <a:chExt cx="0" cy="0"/>
+        </a:xfrm>
+      </p:grpSpPr>
+      <p:sp>
+        <p:nvSpPr>
+          <p:cNvPr id="2" name="Title 1"/>
+          <p:cNvSpPr>
+            <a:spLocks noGrp="1"/>
+          </p:cNvSpPr>
+          <p:nvPr>
+            <p:ph type="title"/>
+          </p:nvPr>
+        </p:nvSpPr>
+        <p:spPr/>
+        <p:txBody>
+          <a:bodyPr/>
+          <a:lstStyle/>
+          <a:p>
+            <a:pPr lvl="0" indent="0" marL="0">
+              <a:buNone/>
+            </a:pPr>
+            <a:r>
+              <a:rPr/>
+              <a:t>9. Technical Appendices</a:t>
+            </a:r>
+          </a:p>
+        </p:txBody>
+      </p:sp>
+      <p:sp>
+        <p:nvSpPr>
+          <p:cNvPr id="3" name="Content Placeholder 2"/>
+          <p:cNvSpPr>
+            <a:spLocks noGrp="1"/>
+          </p:cNvSpPr>
+          <p:nvPr>
+            <p:ph idx="1"/>
+          </p:nvPr>
+        </p:nvSpPr>
+        <p:spPr/>
+        <p:txBody>
+          <a:bodyPr/>
+          <a:lstStyle/>
+          <a:p>
+            <a:pPr lvl="0" indent="0" marL="0">
+              <a:spcBef>
+                <a:spcPts val="3000"/>
+              </a:spcBef>
+              <a:buNone/>
+            </a:pPr>
+            <a:r>
+              <a:rPr b="1"/>
+              <a:t>9.1 Complete File Structure</a:t>
+            </a:r>
+          </a:p>
+          <a:p>
+            <a:pPr lvl="0" indent="0">
+              <a:buNone/>
+            </a:pPr>
+            <a:r>
+              <a:rPr>
+                <a:latin typeface="Courier"/>
+              </a:rPr>
+              <a:t>RMB600_mini_project/
+├── robot_simulation.m          # Main simulation with MoveL/MoveJ
+├── test_functions.m            # Comprehensive test suite
+├── compare_movej_movel.m       # Performance comparison script
+├── generate_media_online.m     # Figure generation script
+├── robot/
+│   ├── test.urdf              # Robot model definition
+│   └── IRB1600/
+│       ├── base.stl           # 3D mesh files
+│       ├── link1.stl
+│       ├── link2.stl
+│       ├── link3.stl
+│       ├── link4.stl
+│       ├── link5.stl
+│       └── link6.stl
+├── figures/
+│   ├── fig1_error_message.png
+│   ├── fig3_test_results.png
+│   ├── fig4_movl_path.png
+│   ├── fig5_slerp_comparison.png
+│   ├── fig6_movej_path.png
+│   ├── fig8_frame_hierarchy.png
+│   ├── fig9_pentagon_path.png
+│   └── fig10_performance_chart.png
+├── FINAL_COMPREHENSIVE_REPORT.md    # This document
+├── PROJECT_REPORT.md                # Academic report
+├── COMPREHENSIVE_ARTICLE.md         # Detailed article
+├── PRESENTATION.md                  # Slide deck
+└── README.md                        # Quick start guide</a:t>
+            </a:r>
+          </a:p>
+          <a:p>
+            <a:pPr lvl="0" indent="0" marL="0">
+              <a:spcBef>
+                <a:spcPts val="3000"/>
+              </a:spcBef>
+              <a:buNone/>
+            </a:pPr>
+            <a:r>
+              <a:rPr b="1"/>
+              <a:t>9.2 Execution Instructions</a:t>
+            </a:r>
+          </a:p>
+          <a:p>
+            <a:pPr lvl="0" indent="0" marL="0">
+              <a:buNone/>
+            </a:pPr>
+            <a:r>
+              <a:rPr b="1"/>
+              <a:t>Quick Start:</a:t>
+            </a:r>
+          </a:p>
+          <a:p>
+            <a:pPr lvl="0" indent="-342900" marL="342900">
+              <a:buAutoNum type="arabicPeriod"/>
+            </a:pPr>
+            <a:r>
+              <a:rPr b="1"/>
+              <a:t>Load Robot Model:</a:t>
+            </a:r>
+          </a:p>
+          <a:p>
+            <a:pPr lvl="0" indent="0">
+              <a:buNone/>
+            </a:pPr>
+            <a:r>
+              <a:rPr>
+                <a:solidFill>
+                  <a:srgbClr val="19177C"/>
+                </a:solidFill>
+                <a:latin typeface="Courier"/>
+              </a:rPr>
+              <a:t>cd</a:t>
+            </a:r>
+            <a:r>
+              <a:rPr>
+                <a:latin typeface="Courier"/>
+              </a:rPr>
+              <a:t> </a:t>
+            </a:r>
+            <a:r>
+              <a:rPr>
+                <a:solidFill>
+                  <a:srgbClr val="BB6688"/>
+                </a:solidFill>
+                <a:latin typeface="Courier"/>
+              </a:rPr>
+              <a:t>'d:\Masters\Robotics\mini_project'</a:t>
+            </a:r>
+            <a:br/>
+            <a:r>
+              <a:rPr>
+                <a:solidFill>
+                  <a:srgbClr val="19177C"/>
+                </a:solidFill>
+                <a:latin typeface="Courier"/>
+              </a:rPr>
+              <a:t>robot_simulation</a:t>
+            </a:r>
+          </a:p>
+          <a:p>
+            <a:pPr lvl="0" indent="-342900" marL="342900">
+              <a:buAutoNum startAt="2" type="arabicPeriod"/>
+            </a:pPr>
+            <a:r>
+              <a:rPr b="1"/>
+              <a:t>Run Tests:</a:t>
+            </a:r>
+          </a:p>
+          <a:p>
+            <a:pPr lvl="0" indent="0">
+              <a:buNone/>
+            </a:pPr>
+            <a:r>
+              <a:rPr>
+                <a:solidFill>
+                  <a:srgbClr val="19177C"/>
+                </a:solidFill>
+                <a:latin typeface="Courier"/>
+              </a:rPr>
+              <a:t>test_functions</a:t>
+            </a:r>
+          </a:p>
+          <a:p>
+            <a:pPr lvl="0" indent="-342900" marL="342900">
+              <a:buAutoNum startAt="3" type="arabicPeriod"/>
+            </a:pPr>
+            <a:r>
+              <a:rPr b="1"/>
+              <a:t>Compare Motion Types:</a:t>
+            </a:r>
+          </a:p>
+          <a:p>
+            <a:pPr lvl="0" indent="0">
+              <a:buNone/>
+            </a:pPr>
+            <a:r>
+              <a:rPr>
+                <a:solidFill>
+                  <a:srgbClr val="19177C"/>
+                </a:solidFill>
+                <a:latin typeface="Courier"/>
+              </a:rPr>
+              <a:t>compare_movej_movel</a:t>
+            </a:r>
+          </a:p>
+          <a:p>
+            <a:pPr lvl="0" indent="-342900" marL="342900">
+              <a:buAutoNum startAt="4" type="arabicPeriod"/>
+            </a:pPr>
+            <a:r>
+              <a:rPr b="1"/>
+              <a:t>Generate All Figures:</a:t>
+            </a:r>
+          </a:p>
+          <a:p>
+            <a:pPr lvl="0" indent="0">
+              <a:buNone/>
+            </a:pPr>
+            <a:r>
+              <a:rPr>
+                <a:solidFill>
+                  <a:srgbClr val="19177C"/>
+                </a:solidFill>
+                <a:latin typeface="Courier"/>
+              </a:rPr>
+              <a:t>generate_media_online</a:t>
+            </a:r>
+          </a:p>
+          <a:p>
+            <a:pPr lvl="0" indent="0" marL="0">
+              <a:spcBef>
+                <a:spcPts val="3000"/>
+              </a:spcBef>
+              <a:buNone/>
+            </a:pPr>
+            <a:r>
+              <a:rPr b="1"/>
+              <a:t>9.3 System Requirements</a:t>
+            </a:r>
+          </a:p>
+          <a:p>
+            <a:pPr lvl="0" indent="0" marL="0">
+              <a:buNone/>
+            </a:pPr>
+            <a:r>
+              <a:rPr b="1"/>
+              <a:t>Minimum Requirements:</a:t>
+            </a:r>
+            <a:r>
+              <a:rPr/>
+              <a:t> - MATLAB R2020a or newer - Robotics System Toolbox - 4 GB RAM - 500 MB disk space</a:t>
+            </a:r>
+          </a:p>
+          <a:p>
+            <a:pPr lvl="0" indent="0" marL="0">
+              <a:buNone/>
+            </a:pPr>
+            <a:r>
+              <a:rPr b="1"/>
+              <a:t>Recommended:</a:t>
+            </a:r>
+            <a:r>
+              <a:rPr/>
+              <a:t> - MATLAB R2023b (latest features) - 8 GB RAM (smoother visualization) - GPU (optional, for faster rendering)</a:t>
+            </a:r>
+          </a:p>
+          <a:p>
+            <a:pPr lvl="0" indent="0" marL="0">
+              <a:spcBef>
+                <a:spcPts val="3000"/>
+              </a:spcBef>
+              <a:buNone/>
+            </a:pPr>
+            <a:r>
+              <a:rPr b="1"/>
+              <a:t>9.4 Known Issues and Solutions</a:t>
+            </a:r>
+          </a:p>
+          <a:p>
+            <a:pPr lvl="0" indent="0" marL="0">
+              <a:buNone/>
+            </a:pPr>
+            <a:r>
+              <a:rPr b="1"/>
+              <a:t>Issue 1: Joint Limit Warnings</a:t>
+            </a:r>
+          </a:p>
+          <a:p>
+            <a:pPr lvl="0" indent="0">
+              <a:buNone/>
+            </a:pPr>
+            <a:r>
+              <a:rPr>
+                <a:latin typeface="Courier"/>
+              </a:rPr>
+              <a:t>Warning: The provided robot configuration violates the predefined joint limits.</a:t>
+            </a:r>
+          </a:p>
+          <a:p>
+            <a:pPr lvl="0" indent="0" marL="0">
+              <a:buNone/>
+            </a:pPr>
+            <a:r>
+              <a:rPr b="1"/>
+              <a:t>Solution</a:t>
+            </a:r>
+            <a:r>
+              <a:rPr/>
+              <a:t>: Updated URDF with realistic ABB IRB1600 limits (±180° for most joints).</a:t>
+            </a:r>
+          </a:p>
+          <a:p>
+            <a:pPr lvl="0" indent="0" marL="0">
+              <a:buNone/>
+            </a:pPr>
+            <a:r>
+              <a:rPr b="1"/>
+              <a:t>Issue 2: Figure Generation Stuck</a:t>
+            </a:r>
+          </a:p>
+          <a:p>
+            <a:pPr lvl="0" indent="0">
+              <a:buNone/>
+            </a:pPr>
+            <a:r>
+              <a:rPr>
+                <a:latin typeface="Courier"/>
+              </a:rPr>
+              <a:t>Script hangs at Figure 2 generation...</a:t>
+            </a:r>
+          </a:p>
+          <a:p>
+            <a:pPr lvl="0" indent="0" marL="0">
+              <a:buNone/>
+            </a:pPr>
+            <a:r>
+              <a:rPr b="1"/>
+              <a:t>Solution</a:t>
+            </a:r>
+            <a:r>
+              <a:rPr/>
+              <a:t>: Removed premature robot_simulation.m call, added inline function definition.</a:t>
+            </a:r>
+          </a:p>
+          <a:p>
+            <a:pPr lvl="0" indent="0" marL="0">
+              <a:buNone/>
+            </a:pPr>
+            <a:r>
+              <a:rPr b="1"/>
+              <a:t>Issue 3: Nested Figures Directory</a:t>
+            </a:r>
+          </a:p>
+          <a:p>
+            <a:pPr lvl="0" indent="0">
+              <a:buNone/>
+            </a:pPr>
+            <a:r>
+              <a:rPr>
+                <a:latin typeface="Courier"/>
+              </a:rPr>
+              <a:t>Figures saved to figures/figures/ instead of figures/</a:t>
+            </a:r>
+          </a:p>
+          <a:p>
+            <a:pPr lvl="0" indent="0" marL="0">
+              <a:buNone/>
+            </a:pPr>
+            <a:r>
+              <a:rPr b="1"/>
+              <a:t>Solution</a:t>
+            </a:r>
+            <a:r>
+              <a:rPr/>
+              <a:t>: Reorganized directory structure, consolidated all PNGs to </a:t>
+            </a:r>
+            <a:r>
+              <a:rPr>
+                <a:latin typeface="Courier"/>
+              </a:rPr>
+              <a:t>figures/</a:t>
+            </a:r>
+            <a:r>
+              <a:rPr/>
+              <a:t>.</a:t>
+            </a:r>
+          </a:p>
+          <a:p>
+            <a:pPr lvl="0" indent="0" marL="0">
+              <a:spcBef>
+                <a:spcPts val="3000"/>
+              </a:spcBef>
+              <a:buNone/>
+            </a:pPr>
+            <a:r>
+              <a:rPr b="1"/>
+              <a:t>9.5 Contact and Support</a:t>
+            </a:r>
+          </a:p>
+          <a:p>
+            <a:pPr lvl="0" indent="0" marL="0">
+              <a:buNone/>
+            </a:pPr>
+            <a:r>
+              <a:rPr b="1"/>
+              <a:t>Project Repository</a:t>
+            </a:r>
+            <a:r>
+              <a:rPr/>
+              <a:t>: github.com/abhi-mdu/RMB600_mini_project</a:t>
+            </a:r>
+            <a:br/>
+            <a:r>
+              <a:rPr b="1"/>
+              <a:t>Course</a:t>
+            </a:r>
+            <a:r>
+              <a:rPr/>
+              <a:t>: RMB600 - Advanced Robotics</a:t>
+            </a:r>
+            <a:br/>
+            <a:r>
+              <a:rPr b="1"/>
+              <a:t>Institution</a:t>
+            </a:r>
+            <a:r>
+              <a:rPr/>
+              <a:t>: Masters Program in Robotics</a:t>
+            </a:r>
+            <a:br/>
+            <a:r>
+              <a:rPr b="1"/>
+              <a:t>Date</a:t>
+            </a:r>
+            <a:r>
+              <a:rPr/>
+              <a:t>: January 2026</a:t>
+            </a:r>
+          </a:p>
+          <a:p>
+            <a:pPr lvl="0" indent="0" marL="0">
+              <a:buNone/>
+            </a:pPr>
+            <a:r>
+              <a:rPr/>
+              <a:t>For questions or issues, please open a GitHub issue or contact through the course portal.</a:t>
             </a:r>
           </a:p>
         </p:txBody>
@@ -17210,7 +17468,7 @@
             </a:pPr>
             <a:r>
               <a:rPr/>
-              <a:t>9. Technical Appendices</a:t>
+              <a:t>Acknowledgments</a:t>
             </a:r>
           </a:p>
         </p:txBody>
@@ -17231,411 +17489,55 @@
           <a:lstStyle/>
           <a:p>
             <a:pPr lvl="0" indent="0" marL="0">
-              <a:spcBef>
-                <a:spcPts val="3000"/>
-              </a:spcBef>
-              <a:buNone/>
-            </a:pPr>
-            <a:r>
-              <a:rPr b="1"/>
-              <a:t>9.1 Complete File Structure</a:t>
-            </a:r>
-          </a:p>
-          <a:p>
-            <a:pPr lvl="0" indent="0">
-              <a:buNone/>
-            </a:pPr>
-            <a:r>
-              <a:rPr>
-                <a:latin typeface="Courier"/>
-              </a:rPr>
-              <a:t>RMB600_mini_project/
-├── robot_simulation.m          # Main simulation with MoveL/MoveJ
-├── test_functions.m            # Comprehensive test suite
-├── compare_movej_movel.m       # Performance comparison script
-├── generate_media_online.m     # Figure generation script
-├── robot/
-│   ├── test.urdf              # Robot model definition
-│   └── IRB1600/
-│       ├── base.stl           # 3D mesh files
-│       ├── link1.stl
-│       ├── link2.stl
-│       ├── link3.stl
-│       ├── link4.stl
-│       ├── link5.stl
-│       └── link6.stl
-├── figures/
-│   ├── fig1_error_message.png
-│   ├── fig3_test_results.png
-│   ├── fig4_movl_path.png
-│   ├── fig5_slerp_comparison.png
-│   ├── fig6_movej_path.png
-│   ├── fig8_frame_hierarchy.png
-│   ├── fig9_pentagon_path.png
-│   └── fig10_performance_chart.png
-├── FINAL_COMPREHENSIVE_REPORT.md    # This document
-├── PROJECT_REPORT.md                # Academic report
-├── COMPREHENSIVE_ARTICLE.md         # Detailed article
-├── PRESENTATION.md                  # Slide deck
-└── README.md                        # Quick start guide</a:t>
-            </a:r>
-          </a:p>
-          <a:p>
-            <a:pPr lvl="0" indent="0" marL="0">
-              <a:spcBef>
-                <a:spcPts val="3000"/>
-              </a:spcBef>
-              <a:buNone/>
-            </a:pPr>
-            <a:r>
-              <a:rPr b="1"/>
-              <a:t>9.2 Execution Instructions</a:t>
-            </a:r>
-          </a:p>
-          <a:p>
-            <a:pPr lvl="0" indent="0" marL="0">
-              <a:buNone/>
-            </a:pPr>
-            <a:r>
-              <a:rPr b="1"/>
-              <a:t>Quick Start:</a:t>
-            </a:r>
-          </a:p>
-          <a:p>
-            <a:pPr lvl="0" indent="-342900" marL="342900">
-              <a:buAutoNum type="arabicPeriod"/>
-            </a:pPr>
-            <a:r>
-              <a:rPr b="1"/>
-              <a:t>Load Robot Model:</a:t>
-            </a:r>
-          </a:p>
-          <a:p>
-            <a:pPr lvl="0" indent="0">
-              <a:buNone/>
-            </a:pPr>
-            <a:r>
-              <a:rPr>
-                <a:solidFill>
-                  <a:srgbClr val="19177C"/>
-                </a:solidFill>
-                <a:latin typeface="Courier"/>
-              </a:rPr>
-              <a:t>cd</a:t>
-            </a:r>
-            <a:r>
-              <a:rPr>
-                <a:latin typeface="Courier"/>
-              </a:rPr>
-              <a:t> </a:t>
-            </a:r>
-            <a:r>
-              <a:rPr>
-                <a:solidFill>
-                  <a:srgbClr val="BB6688"/>
-                </a:solidFill>
-                <a:latin typeface="Courier"/>
-              </a:rPr>
-              <a:t>'d:\Masters\Robotics\mini_project'</a:t>
-            </a:r>
-            <a:br/>
-            <a:r>
-              <a:rPr>
-                <a:solidFill>
-                  <a:srgbClr val="19177C"/>
-                </a:solidFill>
-                <a:latin typeface="Courier"/>
-              </a:rPr>
-              <a:t>robot_simulation</a:t>
-            </a:r>
-          </a:p>
-          <a:p>
-            <a:pPr lvl="0" indent="-342900" marL="342900">
-              <a:buAutoNum startAt="2" type="arabicPeriod"/>
-            </a:pPr>
-            <a:r>
-              <a:rPr b="1"/>
-              <a:t>Run Tests:</a:t>
-            </a:r>
-          </a:p>
-          <a:p>
-            <a:pPr lvl="0" indent="0">
-              <a:buNone/>
-            </a:pPr>
-            <a:r>
-              <a:rPr>
-                <a:solidFill>
-                  <a:srgbClr val="19177C"/>
-                </a:solidFill>
-                <a:latin typeface="Courier"/>
-              </a:rPr>
-              <a:t>test_functions</a:t>
-            </a:r>
-          </a:p>
-          <a:p>
-            <a:pPr lvl="0" indent="-342900" marL="342900">
-              <a:buAutoNum startAt="3" type="arabicPeriod"/>
-            </a:pPr>
-            <a:r>
-              <a:rPr b="1"/>
-              <a:t>Compare Motion Types:</a:t>
-            </a:r>
-          </a:p>
-          <a:p>
-            <a:pPr lvl="0" indent="0">
-              <a:buNone/>
-            </a:pPr>
-            <a:r>
-              <a:rPr>
-                <a:solidFill>
-                  <a:srgbClr val="19177C"/>
-                </a:solidFill>
-                <a:latin typeface="Courier"/>
-              </a:rPr>
-              <a:t>compare_movej_movel</a:t>
-            </a:r>
-          </a:p>
-          <a:p>
-            <a:pPr lvl="0" indent="-342900" marL="342900">
-              <a:buAutoNum startAt="4" type="arabicPeriod"/>
-            </a:pPr>
-            <a:r>
-              <a:rPr b="1"/>
-              <a:t>Generate All Figures:</a:t>
-            </a:r>
-          </a:p>
-          <a:p>
-            <a:pPr lvl="0" indent="0">
-              <a:buNone/>
-            </a:pPr>
-            <a:r>
-              <a:rPr>
-                <a:solidFill>
-                  <a:srgbClr val="19177C"/>
-                </a:solidFill>
-                <a:latin typeface="Courier"/>
-              </a:rPr>
-              <a:t>generate_media_online</a:t>
-            </a:r>
-          </a:p>
-          <a:p>
-            <a:pPr lvl="0" indent="0" marL="0">
-              <a:spcBef>
-                <a:spcPts val="3000"/>
-              </a:spcBef>
-              <a:buNone/>
-            </a:pPr>
-            <a:r>
-              <a:rPr b="1"/>
-              <a:t>9.3 System Requirements</a:t>
-            </a:r>
-          </a:p>
-          <a:p>
-            <a:pPr lvl="0" indent="0" marL="0">
-              <a:buNone/>
-            </a:pPr>
-            <a:r>
-              <a:rPr b="1"/>
-              <a:t>Minimum Requirements:</a:t>
-            </a:r>
-            <a:r>
-              <a:rPr/>
-              <a:t> - MATLAB R2020a or newer - Robotics System Toolbox - 4 GB RAM - 500 MB disk space</a:t>
-            </a:r>
-          </a:p>
-          <a:p>
-            <a:pPr lvl="0" indent="0" marL="0">
-              <a:buNone/>
-            </a:pPr>
-            <a:r>
-              <a:rPr b="1"/>
-              <a:t>Recommended:</a:t>
-            </a:r>
-            <a:r>
-              <a:rPr/>
-              <a:t> - MATLAB R2023b (latest features) - 8 GB RAM (smoother visualization) - GPU (optional, for faster rendering)</a:t>
-            </a:r>
-          </a:p>
-          <a:p>
-            <a:pPr lvl="0" indent="0" marL="0">
-              <a:spcBef>
-                <a:spcPts val="3000"/>
-              </a:spcBef>
-              <a:buNone/>
-            </a:pPr>
-            <a:r>
-              <a:rPr b="1"/>
-              <a:t>9.4 Known Issues and Solutions</a:t>
-            </a:r>
-          </a:p>
-          <a:p>
-            <a:pPr lvl="0" indent="0" marL="0">
-              <a:buNone/>
-            </a:pPr>
-            <a:r>
-              <a:rPr b="1"/>
-              <a:t>Issue 1: Joint Limit Warnings</a:t>
-            </a:r>
-          </a:p>
-          <a:p>
-            <a:pPr lvl="0" indent="0">
-              <a:buNone/>
-            </a:pPr>
-            <a:r>
-              <a:rPr>
-                <a:latin typeface="Courier"/>
-              </a:rPr>
-              <a:t>Warning: The provided robot configuration violates the predefined joint limits.</a:t>
-            </a:r>
-          </a:p>
-          <a:p>
-            <a:pPr lvl="0" indent="0" marL="0">
-              <a:buNone/>
-            </a:pPr>
-            <a:r>
-              <a:rPr b="1"/>
-              <a:t>Solution</a:t>
-            </a:r>
-            <a:r>
-              <a:rPr/>
-              <a:t>: Updated URDF with realistic ABB IRB1600 limits (±180° for most joints).</a:t>
-            </a:r>
-          </a:p>
-          <a:p>
-            <a:pPr lvl="0" indent="0" marL="0">
-              <a:buNone/>
-            </a:pPr>
-            <a:r>
-              <a:rPr b="1"/>
-              <a:t>Issue 2: Figure Generation Stuck</a:t>
-            </a:r>
-          </a:p>
-          <a:p>
-            <a:pPr lvl="0" indent="0">
-              <a:buNone/>
-            </a:pPr>
-            <a:r>
-              <a:rPr>
-                <a:latin typeface="Courier"/>
-              </a:rPr>
-              <a:t>Script hangs at Figure 2 generation...</a:t>
-            </a:r>
-          </a:p>
-          <a:p>
-            <a:pPr lvl="0" indent="0" marL="0">
-              <a:buNone/>
-            </a:pPr>
-            <a:r>
-              <a:rPr b="1"/>
-              <a:t>Solution</a:t>
-            </a:r>
-            <a:r>
-              <a:rPr/>
-              <a:t>: Removed premature robot_simulation.m call, added inline function definition.</a:t>
-            </a:r>
-          </a:p>
-          <a:p>
-            <a:pPr lvl="0" indent="0" marL="0">
-              <a:buNone/>
-            </a:pPr>
-            <a:r>
-              <a:rPr b="1"/>
-              <a:t>Issue 3: Nested Figures Directory</a:t>
-            </a:r>
-          </a:p>
-          <a:p>
-            <a:pPr lvl="0" indent="0">
-              <a:buNone/>
-            </a:pPr>
-            <a:r>
-              <a:rPr>
-                <a:latin typeface="Courier"/>
-              </a:rPr>
-              <a:t>Figures saved to figures/figures/ instead of figures/</a:t>
-            </a:r>
-          </a:p>
-          <a:p>
-            <a:pPr lvl="0" indent="0" marL="0">
-              <a:buNone/>
-            </a:pPr>
-            <a:r>
-              <a:rPr b="1"/>
-              <a:t>Solution</a:t>
-            </a:r>
-            <a:r>
-              <a:rPr/>
-              <a:t>: Reorganized directory structure, consolidated all PNGs to </a:t>
-            </a:r>
-            <a:r>
-              <a:rPr>
-                <a:latin typeface="Courier"/>
-              </a:rPr>
-              <a:t>figures/</a:t>
-            </a:r>
-            <a:r>
-              <a:rPr/>
-              <a:t>.</a:t>
-            </a:r>
-          </a:p>
-          <a:p>
-            <a:pPr lvl="0" indent="0" marL="0">
-              <a:spcBef>
-                <a:spcPts val="3000"/>
-              </a:spcBef>
-              <a:buNone/>
-            </a:pPr>
-            <a:r>
-              <a:rPr b="1"/>
-              <a:t>9.5 Contact and Support</a:t>
-            </a:r>
-          </a:p>
-          <a:p>
-            <a:pPr lvl="0" indent="0" marL="0">
-              <a:buNone/>
-            </a:pPr>
-            <a:r>
-              <a:rPr b="1"/>
-              <a:t>Project Repository</a:t>
-            </a:r>
-            <a:r>
-              <a:rPr/>
-              <a:t>: github.com/abhi-mdu/RMB600_mini_project</a:t>
-            </a:r>
-            <a:br/>
-            <a:r>
-              <a:rPr b="1"/>
-              <a:t>Course</a:t>
-            </a:r>
-            <a:r>
-              <a:rPr/>
-              <a:t>: RMB600 - Advanced Robotics</a:t>
-            </a:r>
-            <a:br/>
-            <a:r>
-              <a:rPr b="1"/>
-              <a:t>Institution</a:t>
-            </a:r>
-            <a:r>
-              <a:rPr/>
-              <a:t>: Masters Program in Robotics</a:t>
-            </a:r>
-            <a:br/>
-            <a:r>
-              <a:rPr b="1"/>
-              <a:t>Date</a:t>
-            </a:r>
-            <a:r>
-              <a:rPr/>
-              <a:t>: January 2026</a:t>
-            </a:r>
-          </a:p>
-          <a:p>
-            <a:pPr lvl="0" indent="0" marL="0">
-              <a:buNone/>
-            </a:pPr>
-            <a:r>
-              <a:rPr/>
-              <a:t>For questions or issues, please open a GitHub issue or contact through the course portal.</a:t>
+              <a:buNone/>
+            </a:pPr>
+            <a:r>
+              <a:rPr/>
+              <a:t>This project was completed as part of the RMB600 course requirements. Special thanks to:</a:t>
+            </a:r>
+          </a:p>
+          <a:p>
+            <a:pPr lvl="0"/>
+            <a:r>
+              <a:rPr b="1"/>
+              <a:t>Course Instructors</a:t>
+            </a:r>
+            <a:r>
+              <a:rPr/>
+              <a:t>: For providing the initial RAPID code and project framework</a:t>
+            </a:r>
+          </a:p>
+          <a:p>
+            <a:pPr lvl="0"/>
+            <a:r>
+              <a:rPr b="1"/>
+              <a:t>MATLAB Documentation</a:t>
+            </a:r>
+            <a:r>
+              <a:rPr/>
+              <a:t>: For comprehensive Robotics System Toolbox examples</a:t>
+            </a:r>
+          </a:p>
+          <a:p>
+            <a:pPr lvl="0"/>
+            <a:r>
+              <a:rPr b="1"/>
+              <a:t>ABB Robotics</a:t>
+            </a:r>
+            <a:r>
+              <a:rPr/>
+              <a:t>: For publicly available IRB1600 specifications</a:t>
+            </a:r>
+          </a:p>
+          <a:p>
+            <a:pPr lvl="0"/>
+            <a:r>
+              <a:rPr b="1"/>
+              <a:t>Open Source Community</a:t>
+            </a:r>
+            <a:r>
+              <a:rPr/>
+              <a:t>: For URDF parsing and visualization tools</a:t>
             </a:r>
           </a:p>
         </p:txBody>
@@ -17682,7 +17584,7 @@
             </a:pPr>
             <a:r>
               <a:rPr/>
-              <a:t>Acknowledgments</a:t>
+              <a:t>References</a:t>
             </a:r>
           </a:p>
         </p:txBody>
@@ -17702,56 +17604,122 @@
           <a:bodyPr/>
           <a:lstStyle/>
           <a:p>
-            <a:pPr lvl="0" indent="0" marL="0">
-              <a:buNone/>
-            </a:pPr>
-            <a:r>
-              <a:rPr/>
-              <a:t>This project was completed as part of the RMB600 course requirements. Special thanks to:</a:t>
-            </a:r>
-          </a:p>
-          <a:p>
-            <a:pPr lvl="0"/>
-            <a:r>
-              <a:rPr b="1"/>
-              <a:t>Course Instructors</a:t>
-            </a:r>
-            <a:r>
-              <a:rPr/>
-              <a:t>: For providing the initial RAPID code and project framework</a:t>
-            </a:r>
-          </a:p>
-          <a:p>
-            <a:pPr lvl="0"/>
-            <a:r>
-              <a:rPr b="1"/>
-              <a:t>MATLAB Documentation</a:t>
-            </a:r>
-            <a:r>
-              <a:rPr/>
-              <a:t>: For comprehensive Robotics System Toolbox examples</a:t>
-            </a:r>
-          </a:p>
-          <a:p>
-            <a:pPr lvl="0"/>
-            <a:r>
-              <a:rPr b="1"/>
-              <a:t>ABB Robotics</a:t>
-            </a:r>
-            <a:r>
-              <a:rPr/>
-              <a:t>: For publicly available IRB1600 specifications</a:t>
-            </a:r>
-          </a:p>
-          <a:p>
-            <a:pPr lvl="0"/>
-            <a:r>
-              <a:rPr b="1"/>
-              <a:t>Open Source Community</a:t>
-            </a:r>
-            <a:r>
-              <a:rPr/>
-              <a:t>: For URDF parsing and visualization tools</a:t>
+            <a:pPr lvl="0" indent="-342900" marL="342900">
+              <a:buAutoNum type="arabicPeriod"/>
+            </a:pPr>
+            <a:r>
+              <a:rPr/>
+              <a:t>ABB Robotics. (2023). </a:t>
+            </a:r>
+            <a:r>
+              <a:rPr i="1"/>
+              <a:t>IRB 1600 Product Manual</a:t>
+            </a:r>
+            <a:r>
+              <a:rPr/>
+              <a:t>. ABB Inc.</a:t>
+            </a:r>
+          </a:p>
+          <a:p>
+            <a:pPr lvl="0" indent="-342900" marL="342900">
+              <a:buAutoNum type="arabicPeriod"/>
+            </a:pPr>
+            <a:r>
+              <a:rPr/>
+              <a:t>Shoemake, K. (1985). “Animating rotation with quaternion curves”. </a:t>
+            </a:r>
+            <a:r>
+              <a:rPr i="1"/>
+              <a:t>SIGGRAPH Computer Graphics</a:t>
+            </a:r>
+            <a:r>
+              <a:rPr/>
+              <a:t>, 19(3), 245-254.</a:t>
+            </a:r>
+          </a:p>
+          <a:p>
+            <a:pPr lvl="0" indent="-342900" marL="342900">
+              <a:buAutoNum type="arabicPeriod"/>
+            </a:pPr>
+            <a:r>
+              <a:rPr/>
+              <a:t>MathWorks. (2023). </a:t>
+            </a:r>
+            <a:r>
+              <a:rPr i="1"/>
+              <a:t>Robotics System Toolbox Documentation</a:t>
+            </a:r>
+            <a:r>
+              <a:rPr/>
+              <a:t>. Retrieved from https://www.mathworks.com/help/robotics/</a:t>
+            </a:r>
+          </a:p>
+          <a:p>
+            <a:pPr lvl="0" indent="-342900" marL="342900">
+              <a:buAutoNum type="arabicPeriod"/>
+            </a:pPr>
+            <a:r>
+              <a:rPr/>
+              <a:t>Craig, J. J. (2017). </a:t>
+            </a:r>
+            <a:r>
+              <a:rPr i="1"/>
+              <a:t>Introduction to Robotics: Mechanics and Control</a:t>
+            </a:r>
+            <a:r>
+              <a:rPr/>
+              <a:t> (4th ed.). Pearson.</a:t>
+            </a:r>
+          </a:p>
+          <a:p>
+            <a:pPr lvl="0" indent="-342900" marL="342900">
+              <a:buAutoNum type="arabicPeriod"/>
+            </a:pPr>
+            <a:r>
+              <a:rPr/>
+              <a:t>Siciliano, B., Sciavicco, L., Villani, L., &amp; Oriolo, G. (2010). </a:t>
+            </a:r>
+            <a:r>
+              <a:rPr i="1"/>
+              <a:t>Robotics: Modelling, Planning and Control</a:t>
+            </a:r>
+            <a:r>
+              <a:rPr/>
+              <a:t>. Springer.</a:t>
+            </a:r>
+          </a:p>
+          <a:p>
+            <a:pPr lvl="0" indent="-342900" marL="342900">
+              <a:buAutoNum type="arabicPeriod"/>
+            </a:pPr>
+            <a:r>
+              <a:rPr/>
+              <a:t>Corke, P. (2017). </a:t>
+            </a:r>
+            <a:r>
+              <a:rPr i="1"/>
+              <a:t>Robotics, Vision and Control: Fundamental Algorithms in MATLAB</a:t>
+            </a:r>
+            <a:r>
+              <a:rPr/>
+              <a:t> (2nd ed.). Springer.</a:t>
+            </a:r>
+          </a:p>
+          <a:p>
+            <a:pPr lvl="0" indent="-342900" marL="342900">
+              <a:buAutoNum type="arabicPeriod"/>
+            </a:pPr>
+            <a:r>
+              <a:rPr/>
+              <a:t>Lynch, K. M., &amp; Park, F. C. (2017). </a:t>
+            </a:r>
+            <a:r>
+              <a:rPr i="1"/>
+              <a:t>Modern Robotics: Mechanics, Planning, and Control</a:t>
+            </a:r>
+            <a:r>
+              <a:rPr/>
+              <a:t>. Cambridge University Press.</a:t>
             </a:r>
           </a:p>
         </p:txBody>
@@ -17762,6 +17730,204 @@
 </file>
 
 <file path=ppt/slides/slide3.xml><?xml version="1.0" encoding="utf-8"?>
+<p:sld xmlns:a="http://schemas.openxmlformats.org/drawingml/2006/main" xmlns:r="http://schemas.openxmlformats.org/officeDocument/2006/relationships" xmlns:p="http://schemas.openxmlformats.org/presentationml/2006/main">
+  <p:cSld>
+    <p:spTree>
+      <p:nvGrpSpPr>
+        <p:cNvPr id="1" name=""/>
+        <p:cNvGrpSpPr/>
+        <p:nvPr/>
+      </p:nvGrpSpPr>
+      <p:grpSpPr>
+        <a:xfrm>
+          <a:off x="0" y="0"/>
+          <a:ext cx="0" cy="0"/>
+          <a:chOff x="0" y="0"/>
+          <a:chExt cx="0" cy="0"/>
+        </a:xfrm>
+      </p:grpSpPr>
+      <p:sp>
+        <p:nvSpPr>
+          <p:cNvPr id="2" name="Title 1"/>
+          <p:cNvSpPr>
+            <a:spLocks noGrp="1"/>
+          </p:cNvSpPr>
+          <p:nvPr>
+            <p:ph type="title"/>
+          </p:nvPr>
+        </p:nvSpPr>
+        <p:spPr/>
+        <p:txBody>
+          <a:bodyPr/>
+          <a:lstStyle/>
+          <a:p>
+            <a:pPr lvl="0" indent="0" marL="0">
+              <a:buNone/>
+            </a:pPr>
+            <a:r>
+              <a:rPr/>
+              <a:t>Executive Summary</a:t>
+            </a:r>
+          </a:p>
+        </p:txBody>
+      </p:sp>
+      <p:sp>
+        <p:nvSpPr>
+          <p:cNvPr id="3" name="Content Placeholder 2"/>
+          <p:cNvSpPr>
+            <a:spLocks noGrp="1"/>
+          </p:cNvSpPr>
+          <p:nvPr>
+            <p:ph idx="1"/>
+          </p:nvPr>
+        </p:nvSpPr>
+        <p:spPr/>
+        <p:txBody>
+          <a:bodyPr/>
+          <a:lstStyle/>
+          <a:p>
+            <a:pPr lvl="0" indent="0" marL="0">
+              <a:buNone/>
+            </a:pPr>
+            <a:r>
+              <a:rPr/>
+              <a:t>This comprehensive report documents the successful implementation of industrial robot motion planning by converting ABB’s RAPID programming language to MATLAB. The project achieved all primary objectives with professional-grade results and includes complete visual documentation of all implementations and validations.</a:t>
+            </a:r>
+          </a:p>
+          <a:p>
+            <a:pPr lvl="0" indent="0" marL="0">
+              <a:spcBef>
+                <a:spcPts val="3000"/>
+              </a:spcBef>
+              <a:buNone/>
+            </a:pPr>
+            <a:r>
+              <a:rPr b="1"/>
+              <a:t>Key Achievements</a:t>
+            </a:r>
+          </a:p>
+          <a:p>
+            <a:pPr lvl="0" indent="0" marL="0">
+              <a:buNone/>
+            </a:pPr>
+            <a:r>
+              <a:rPr/>
+              <a:t>✅ </a:t>
+            </a:r>
+            <a:r>
+              <a:rPr b="1"/>
+              <a:t>100% Implementation Success</a:t>
+            </a:r>
+            <a:r>
+              <a:rPr/>
+              <a:t> - </a:t>
+            </a:r>
+            <a:r>
+              <a:rPr>
+                <a:latin typeface="Courier"/>
+              </a:rPr>
+              <a:t>quat2rotMatrix()</a:t>
+            </a:r>
+            <a:r>
+              <a:rPr/>
+              <a:t> - Quaternion to rotation matrix conversion - </a:t>
+            </a:r>
+            <a:r>
+              <a:rPr>
+                <a:latin typeface="Courier"/>
+              </a:rPr>
+              <a:t>MoveL()</a:t>
+            </a:r>
+            <a:r>
+              <a:rPr/>
+              <a:t> - Linear Cartesian motion with SLERP interpolation - </a:t>
+            </a:r>
+            <a:r>
+              <a:rPr>
+                <a:latin typeface="Courier"/>
+              </a:rPr>
+              <a:t>MoveJ()</a:t>
+            </a:r>
+            <a:r>
+              <a:rPr/>
+              <a:t> - Optimized joint-space motion - Complete RAPID code alignment</a:t>
+            </a:r>
+          </a:p>
+          <a:p>
+            <a:pPr lvl="0" indent="0" marL="0">
+              <a:buNone/>
+            </a:pPr>
+            <a:r>
+              <a:rPr/>
+              <a:t>✅ </a:t>
+            </a:r>
+            <a:r>
+              <a:rPr b="1"/>
+              <a:t>Mathematical Precision</a:t>
+            </a:r>
+            <a:r>
+              <a:rPr/>
+              <a:t> - Rotation matrix determinant: 1.0 ± 10⁻¹⁶ - Orthogonality error: &lt; 10⁻¹⁵ - Path linearity deviation: 0 m (perfect)</a:t>
+            </a:r>
+          </a:p>
+          <a:p>
+            <a:pPr lvl="0" indent="0" marL="0">
+              <a:buNone/>
+            </a:pPr>
+            <a:r>
+              <a:rPr/>
+              <a:t>✅ </a:t>
+            </a:r>
+            <a:r>
+              <a:rPr b="1"/>
+              <a:t>Performance Optimization</a:t>
+            </a:r>
+            <a:r>
+              <a:rPr/>
+              <a:t> - </a:t>
+            </a:r>
+            <a:r>
+              <a:rPr b="1"/>
+              <a:t>15x faster</a:t>
+            </a:r>
+            <a:r>
+              <a:rPr/>
+              <a:t> repositioning with MoveJ - </a:t>
+            </a:r>
+            <a:r>
+              <a:rPr b="1"/>
+              <a:t>93% fewer</a:t>
+            </a:r>
+            <a:r>
+              <a:rPr/>
+              <a:t> inverse kinematics calls - 1500 ms (MoveL) reduced to 100 ms (MoveJ)</a:t>
+            </a:r>
+          </a:p>
+          <a:p>
+            <a:pPr lvl="0" indent="0" marL="0">
+              <a:buNone/>
+            </a:pPr>
+            <a:r>
+              <a:rPr/>
+              <a:t>✅ </a:t>
+            </a:r>
+            <a:r>
+              <a:rPr b="1"/>
+              <a:t>Complete Documentation</a:t>
+            </a:r>
+            <a:r>
+              <a:rPr/>
+              <a:t> - 10 professional figures generated (including all visualizations) - Comprehensive test suite (100% pass rate) - Academic-quality report and presentation</a:t>
+            </a:r>
+          </a:p>
+        </p:txBody>
+      </p:sp>
+    </p:spTree>
+  </p:cSld>
+</p:sld>
+</file>
+
+<file path=ppt/slides/slide30.xml><?xml version="1.0" encoding="utf-8"?>
 <p:sld xmlns:a="http://schemas.openxmlformats.org/drawingml/2006/main" xmlns:r="http://schemas.openxmlformats.org/officeDocument/2006/relationships" xmlns:p="http://schemas.openxmlformats.org/presentationml/2006/main">
   <p:cSld>
     <p:spTree>
@@ -17798,229 +17964,59 @@
             </a:pPr>
             <a:r>
               <a:rPr b="1"/>
-              <a:t>Project</a:t>
-            </a:r>
-            <a:r>
-              <a:rPr/>
-              <a:t>: RMB600 Mini Project - Industrial Robot Programming</a:t>
-            </a:r>
-            <a:br/>
-            <a:r>
-              <a:rPr b="1"/>
-              <a:t>Institution</a:t>
-            </a:r>
-            <a:r>
-              <a:rPr/>
-              <a:t>: Masters Program in Robotics</a:t>
-            </a:r>
-            <a:br/>
-            <a:r>
-              <a:rPr b="1"/>
-              <a:t>Date</a:t>
-            </a:r>
-            <a:r>
-              <a:rPr/>
-              <a:t>: January 15, 2026</a:t>
-            </a:r>
-            <a:br/>
-            <a:r>
-              <a:rPr b="1"/>
-              <a:t>Author</a:t>
-            </a:r>
-            <a:r>
-              <a:rPr/>
-              <a:t>: Graduate Student</a:t>
-            </a:r>
-            <a:br/>
-            <a:r>
-              <a:rPr b="1"/>
-              <a:t>Repository</a:t>
-            </a:r>
-            <a:r>
-              <a:rPr/>
-              <a:t>: github.com/abhi-mdu/RMB600_mini_project</a:t>
-            </a:r>
-          </a:p>
-        </p:txBody>
-      </p:sp>
-    </p:spTree>
-  </p:cSld>
-</p:sld>
-</file>
-
-<file path=ppt/slides/slide30.xml><?xml version="1.0" encoding="utf-8"?>
-<p:sld xmlns:a="http://schemas.openxmlformats.org/drawingml/2006/main" xmlns:r="http://schemas.openxmlformats.org/officeDocument/2006/relationships" xmlns:p="http://schemas.openxmlformats.org/presentationml/2006/main">
-  <p:cSld>
-    <p:spTree>
-      <p:nvGrpSpPr>
-        <p:cNvPr id="1" name=""/>
-        <p:cNvGrpSpPr/>
-        <p:nvPr/>
-      </p:nvGrpSpPr>
-      <p:grpSpPr>
-        <a:xfrm>
-          <a:off x="0" y="0"/>
-          <a:ext cx="0" cy="0"/>
-          <a:chOff x="0" y="0"/>
-          <a:chExt cx="0" cy="0"/>
-        </a:xfrm>
-      </p:grpSpPr>
-      <p:sp>
-        <p:nvSpPr>
-          <p:cNvPr id="2" name="Title 1"/>
-          <p:cNvSpPr>
-            <a:spLocks noGrp="1"/>
-          </p:cNvSpPr>
-          <p:nvPr>
-            <p:ph type="title"/>
-          </p:nvPr>
-        </p:nvSpPr>
-        <p:spPr/>
-        <p:txBody>
-          <a:bodyPr/>
-          <a:lstStyle/>
-          <a:p>
-            <a:pPr lvl="0" indent="0" marL="0">
-              <a:buNone/>
-            </a:pPr>
-            <a:r>
-              <a:rPr/>
-              <a:t>References</a:t>
-            </a:r>
-          </a:p>
-        </p:txBody>
-      </p:sp>
-      <p:sp>
-        <p:nvSpPr>
-          <p:cNvPr id="3" name="Content Placeholder 2"/>
-          <p:cNvSpPr>
-            <a:spLocks noGrp="1"/>
-          </p:cNvSpPr>
-          <p:nvPr>
-            <p:ph idx="1"/>
-          </p:nvPr>
-        </p:nvSpPr>
-        <p:spPr/>
-        <p:txBody>
-          <a:bodyPr/>
-          <a:lstStyle/>
-          <a:p>
-            <a:pPr lvl="0" indent="-342900" marL="342900">
-              <a:buAutoNum type="arabicPeriod"/>
-            </a:pPr>
-            <a:r>
-              <a:rPr/>
-              <a:t>ABB Robotics. (2023). </a:t>
-            </a:r>
-            <a:r>
-              <a:rPr i="1"/>
-              <a:t>IRB 1600 Product Manual</a:t>
-            </a:r>
-            <a:r>
-              <a:rPr/>
-              <a:t>. ABB Inc.</a:t>
-            </a:r>
-          </a:p>
-          <a:p>
-            <a:pPr lvl="0" indent="-342900" marL="342900">
-              <a:buAutoNum type="arabicPeriod"/>
-            </a:pPr>
-            <a:r>
-              <a:rPr/>
-              <a:t>Shoemake, K. (1985). “Animating rotation with quaternion curves”. </a:t>
-            </a:r>
-            <a:r>
-              <a:rPr i="1"/>
-              <a:t>SIGGRAPH Computer Graphics</a:t>
-            </a:r>
-            <a:r>
-              <a:rPr/>
-              <a:t>, 19(3), 245-254.</a:t>
-            </a:r>
-          </a:p>
-          <a:p>
-            <a:pPr lvl="0" indent="-342900" marL="342900">
-              <a:buAutoNum type="arabicPeriod"/>
-            </a:pPr>
-            <a:r>
-              <a:rPr/>
-              <a:t>MathWorks. (2023). </a:t>
-            </a:r>
-            <a:r>
-              <a:rPr i="1"/>
-              <a:t>Robotics System Toolbox Documentation</a:t>
-            </a:r>
-            <a:r>
-              <a:rPr/>
-              <a:t>. Retrieved from https://www.mathworks.com/help/robotics/</a:t>
-            </a:r>
-          </a:p>
-          <a:p>
-            <a:pPr lvl="0" indent="-342900" marL="342900">
-              <a:buAutoNum type="arabicPeriod"/>
-            </a:pPr>
-            <a:r>
-              <a:rPr/>
-              <a:t>Craig, J. J. (2017). </a:t>
-            </a:r>
-            <a:r>
-              <a:rPr i="1"/>
-              <a:t>Introduction to Robotics: Mechanics and Control</a:t>
-            </a:r>
-            <a:r>
-              <a:rPr/>
-              <a:t> (4th ed.). Pearson.</a:t>
-            </a:r>
-          </a:p>
-          <a:p>
-            <a:pPr lvl="0" indent="-342900" marL="342900">
-              <a:buAutoNum type="arabicPeriod"/>
-            </a:pPr>
-            <a:r>
-              <a:rPr/>
-              <a:t>Siciliano, B., Sciavicco, L., Villani, L., &amp; Oriolo, G. (2010). </a:t>
-            </a:r>
-            <a:r>
-              <a:rPr i="1"/>
-              <a:t>Robotics: Modelling, Planning and Control</a:t>
-            </a:r>
-            <a:r>
-              <a:rPr/>
-              <a:t>. Springer.</a:t>
-            </a:r>
-          </a:p>
-          <a:p>
-            <a:pPr lvl="0" indent="-342900" marL="342900">
-              <a:buAutoNum type="arabicPeriod"/>
-            </a:pPr>
-            <a:r>
-              <a:rPr/>
-              <a:t>Corke, P. (2017). </a:t>
-            </a:r>
-            <a:r>
-              <a:rPr i="1"/>
-              <a:t>Robotics, Vision and Control: Fundamental Algorithms in MATLAB</a:t>
-            </a:r>
-            <a:r>
-              <a:rPr/>
-              <a:t> (2nd ed.). Springer.</a:t>
-            </a:r>
-          </a:p>
-          <a:p>
-            <a:pPr lvl="0" indent="-342900" marL="342900">
-              <a:buAutoNum type="arabicPeriod"/>
-            </a:pPr>
-            <a:r>
-              <a:rPr/>
-              <a:t>Lynch, K. M., &amp; Park, F. C. (2017). </a:t>
-            </a:r>
-            <a:r>
-              <a:rPr i="1"/>
-              <a:t>Modern Robotics: Mechanics, Planning, and Control</a:t>
-            </a:r>
-            <a:r>
-              <a:rPr/>
-              <a:t>. Cambridge University Press.</a:t>
+              <a:t>Document Information:</a:t>
+            </a:r>
+            <a:r>
+              <a:rPr/>
+              <a:t> - </a:t>
+            </a:r>
+            <a:r>
+              <a:rPr b="1"/>
+              <a:t>Version</a:t>
+            </a:r>
+            <a:r>
+              <a:rPr/>
+              <a:t>: 2.0 (Final - Complete) - </a:t>
+            </a:r>
+            <a:r>
+              <a:rPr b="1"/>
+              <a:t>Generated</a:t>
+            </a:r>
+            <a:r>
+              <a:rPr/>
+              <a:t>: January 15, 2026 - </a:t>
+            </a:r>
+            <a:r>
+              <a:rPr b="1"/>
+              <a:t>Format</a:t>
+            </a:r>
+            <a:r>
+              <a:rPr/>
+              <a:t>: Markdown with embedded PNG figures - </a:t>
+            </a:r>
+            <a:r>
+              <a:rPr b="1"/>
+              <a:t>Page Count</a:t>
+            </a:r>
+            <a:r>
+              <a:rPr/>
+              <a:t>: ~50 pages (when rendered to PDF) - </a:t>
+            </a:r>
+            <a:r>
+              <a:rPr b="1"/>
+              <a:t>Word Count</a:t>
+            </a:r>
+            <a:r>
+              <a:rPr/>
+              <a:t>: ~13,000 words - </a:t>
+            </a:r>
+            <a:r>
+              <a:rPr b="1"/>
+              <a:t>Figure Count</a:t>
+            </a:r>
+            <a:r>
+              <a:rPr/>
+              <a:t>: 10 high-resolution PNG images (complete set)</a:t>
             </a:r>
           </a:p>
         </p:txBody>
@@ -18066,105 +18062,6 @@
               <a:buNone/>
             </a:pPr>
             <a:r>
-              <a:rPr b="1"/>
-              <a:t>Document Information:</a:t>
-            </a:r>
-            <a:r>
-              <a:rPr/>
-              <a:t> - </a:t>
-            </a:r>
-            <a:r>
-              <a:rPr b="1"/>
-              <a:t>Version</a:t>
-            </a:r>
-            <a:r>
-              <a:rPr/>
-              <a:t>: 2.0 (Final - Complete) - </a:t>
-            </a:r>
-            <a:r>
-              <a:rPr b="1"/>
-              <a:t>Generated</a:t>
-            </a:r>
-            <a:r>
-              <a:rPr/>
-              <a:t>: January 15, 2026 - </a:t>
-            </a:r>
-            <a:r>
-              <a:rPr b="1"/>
-              <a:t>Format</a:t>
-            </a:r>
-            <a:r>
-              <a:rPr/>
-              <a:t>: Markdown with embedded PNG figures - </a:t>
-            </a:r>
-            <a:r>
-              <a:rPr b="1"/>
-              <a:t>Page Count</a:t>
-            </a:r>
-            <a:r>
-              <a:rPr/>
-              <a:t>: ~50 pages (when rendered to PDF) - </a:t>
-            </a:r>
-            <a:r>
-              <a:rPr b="1"/>
-              <a:t>Word Count</a:t>
-            </a:r>
-            <a:r>
-              <a:rPr/>
-              <a:t>: ~13,000 words - </a:t>
-            </a:r>
-            <a:r>
-              <a:rPr b="1"/>
-              <a:t>Figure Count</a:t>
-            </a:r>
-            <a:r>
-              <a:rPr/>
-              <a:t>: 10 high-resolution PNG images (complete set)</a:t>
-            </a:r>
-          </a:p>
-        </p:txBody>
-      </p:sp>
-    </p:spTree>
-  </p:cSld>
-</p:sld>
-</file>
-
-<file path=ppt/slides/slide32.xml><?xml version="1.0" encoding="utf-8"?>
-<p:sld xmlns:a="http://schemas.openxmlformats.org/drawingml/2006/main" xmlns:r="http://schemas.openxmlformats.org/officeDocument/2006/relationships" xmlns:p="http://schemas.openxmlformats.org/presentationml/2006/main">
-  <p:cSld>
-    <p:spTree>
-      <p:nvGrpSpPr>
-        <p:cNvPr id="1" name=""/>
-        <p:cNvGrpSpPr/>
-        <p:nvPr/>
-      </p:nvGrpSpPr>
-      <p:grpSpPr>
-        <a:xfrm>
-          <a:off x="0" y="0"/>
-          <a:ext cx="0" cy="0"/>
-          <a:chOff x="0" y="0"/>
-          <a:chExt cx="0" cy="0"/>
-        </a:xfrm>
-      </p:grpSpPr>
-      <p:sp>
-        <p:nvSpPr>
-          <p:cNvPr id="3" name="Content Placeholder 2"/>
-          <p:cNvSpPr>
-            <a:spLocks noGrp="1"/>
-          </p:cNvSpPr>
-          <p:nvPr>
-            <p:ph idx="1"/>
-          </p:nvPr>
-        </p:nvSpPr>
-        <p:spPr/>
-        <p:txBody>
-          <a:bodyPr/>
-          <a:lstStyle/>
-          <a:p>
-            <a:pPr lvl="0" indent="0" marL="0">
-              <a:buNone/>
-            </a:pPr>
-            <a:r>
               <a:rPr i="1"/>
               <a:t>End of Report</a:t>
             </a:r>
@@ -18213,7 +18110,7 @@
             </a:pPr>
             <a:r>
               <a:rPr/>
-              <a:t>Executive Summary</a:t>
+              <a:t>Table of Contents</a:t>
             </a:r>
           </a:p>
         </p:txBody>
@@ -18233,138 +18130,84 @@
           <a:bodyPr/>
           <a:lstStyle/>
           <a:p>
-            <a:pPr lvl="0" indent="0" marL="0">
-              <a:buNone/>
-            </a:pPr>
-            <a:r>
-              <a:rPr/>
-              <a:t>This comprehensive report documents the successful implementation of industrial robot motion planning by converting ABB’s RAPID programming language to MATLAB. The project achieved all primary objectives with professional-grade results and includes complete visual documentation of all implementations and validations.</a:t>
-            </a:r>
-          </a:p>
-          <a:p>
-            <a:pPr lvl="0" indent="0" marL="0">
-              <a:spcBef>
-                <a:spcPts val="3000"/>
-              </a:spcBef>
-              <a:buNone/>
-            </a:pPr>
-            <a:r>
-              <a:rPr b="1"/>
-              <a:t>Key Achievements</a:t>
-            </a:r>
-          </a:p>
-          <a:p>
-            <a:pPr lvl="0" indent="0" marL="0">
-              <a:buNone/>
-            </a:pPr>
-            <a:r>
-              <a:rPr/>
-              <a:t>✅ </a:t>
-            </a:r>
-            <a:r>
-              <a:rPr b="1"/>
-              <a:t>100% Implementation Success</a:t>
-            </a:r>
-            <a:r>
-              <a:rPr/>
-              <a:t> - </a:t>
-            </a:r>
-            <a:r>
-              <a:rPr>
-                <a:latin typeface="Courier"/>
-              </a:rPr>
-              <a:t>quat2rotMatrix()</a:t>
-            </a:r>
-            <a:r>
-              <a:rPr/>
-              <a:t> - Quaternion to rotation matrix conversion - </a:t>
-            </a:r>
-            <a:r>
-              <a:rPr>
-                <a:latin typeface="Courier"/>
-              </a:rPr>
-              <a:t>MoveL()</a:t>
-            </a:r>
-            <a:r>
-              <a:rPr/>
-              <a:t> - Linear Cartesian motion with SLERP interpolation - </a:t>
-            </a:r>
-            <a:r>
-              <a:rPr>
-                <a:latin typeface="Courier"/>
-              </a:rPr>
-              <a:t>MoveJ()</a:t>
-            </a:r>
-            <a:r>
-              <a:rPr/>
-              <a:t> - Optimized joint-space motion - Complete RAPID code alignment</a:t>
-            </a:r>
-          </a:p>
-          <a:p>
-            <a:pPr lvl="0" indent="0" marL="0">
-              <a:buNone/>
-            </a:pPr>
-            <a:r>
-              <a:rPr/>
-              <a:t>✅ </a:t>
-            </a:r>
-            <a:r>
-              <a:rPr b="1"/>
-              <a:t>Mathematical Precision</a:t>
-            </a:r>
-            <a:r>
-              <a:rPr/>
-              <a:t> - Rotation matrix determinant: 1.0 ± 10⁻¹⁶ - Orthogonality error: &lt; 10⁻¹⁵ - Path linearity deviation: 0 m (perfect)</a:t>
-            </a:r>
-          </a:p>
-          <a:p>
-            <a:pPr lvl="0" indent="0" marL="0">
-              <a:buNone/>
-            </a:pPr>
-            <a:r>
-              <a:rPr/>
-              <a:t>✅ </a:t>
-            </a:r>
-            <a:r>
-              <a:rPr b="1"/>
-              <a:t>Performance Optimization</a:t>
-            </a:r>
-            <a:r>
-              <a:rPr/>
-              <a:t> - </a:t>
-            </a:r>
-            <a:r>
-              <a:rPr b="1"/>
-              <a:t>15x faster</a:t>
-            </a:r>
-            <a:r>
-              <a:rPr/>
-              <a:t> repositioning with MoveJ - </a:t>
-            </a:r>
-            <a:r>
-              <a:rPr b="1"/>
-              <a:t>93% fewer</a:t>
-            </a:r>
-            <a:r>
-              <a:rPr/>
-              <a:t> inverse kinematics calls - 1500 ms (MoveL) reduced to 100 ms (MoveJ)</a:t>
-            </a:r>
-          </a:p>
-          <a:p>
-            <a:pPr lvl="0" indent="0" marL="0">
-              <a:buNone/>
-            </a:pPr>
-            <a:r>
-              <a:rPr/>
-              <a:t>✅ </a:t>
-            </a:r>
-            <a:r>
-              <a:rPr b="1"/>
-              <a:t>Complete Documentation</a:t>
-            </a:r>
-            <a:r>
-              <a:rPr/>
-              <a:t> - 10 professional figures generated (including all visualizations) - Comprehensive test suite (100% pass rate) - Academic-quality report and presentation</a:t>
+            <a:pPr lvl="0" indent="-342900" marL="342900">
+              <a:buAutoNum type="arabicPeriod"/>
+            </a:pPr>
+            <a:r>
+              <a:rPr/>
+              <a:t>Problem Analysis</a:t>
+            </a:r>
+          </a:p>
+          <a:p>
+            <a:pPr lvl="0" indent="-342900" marL="342900">
+              <a:buAutoNum type="arabicPeriod"/>
+            </a:pPr>
+            <a:r>
+              <a:rPr/>
+              <a:t>Implementation Journey</a:t>
+            </a:r>
+          </a:p>
+          <a:p>
+            <a:pPr lvl="0" indent="-342900" marL="342900">
+              <a:buAutoNum type="arabicPeriod"/>
+            </a:pPr>
+            <a:r>
+              <a:rPr/>
+              <a:t>Mathematical Foundations</a:t>
+            </a:r>
+          </a:p>
+          <a:p>
+            <a:pPr lvl="0" indent="-342900" marL="342900">
+              <a:buAutoNum type="arabicPeriod"/>
+            </a:pPr>
+            <a:r>
+              <a:rPr/>
+              <a:t>Robot Motion Planning</a:t>
+            </a:r>
+          </a:p>
+          <a:p>
+            <a:pPr lvl="0" indent="-342900" marL="342900">
+              <a:buAutoNum type="arabicPeriod"/>
+            </a:pPr>
+            <a:r>
+              <a:rPr/>
+              <a:t>Performance Analysis</a:t>
+            </a:r>
+          </a:p>
+          <a:p>
+            <a:pPr lvl="0" indent="-342900" marL="342900">
+              <a:buAutoNum type="arabicPeriod"/>
+            </a:pPr>
+            <a:r>
+              <a:rPr/>
+              <a:t>Testing and Validation</a:t>
+            </a:r>
+          </a:p>
+          <a:p>
+            <a:pPr lvl="0" indent="-342900" marL="342900">
+              <a:buAutoNum type="arabicPeriod"/>
+            </a:pPr>
+            <a:r>
+              <a:rPr/>
+              <a:t>Visual Documentation</a:t>
+            </a:r>
+          </a:p>
+          <a:p>
+            <a:pPr lvl="0" indent="-342900" marL="342900">
+              <a:buAutoNum type="arabicPeriod"/>
+            </a:pPr>
+            <a:r>
+              <a:rPr/>
+              <a:t>Conclusions and Impact</a:t>
+            </a:r>
+          </a:p>
+          <a:p>
+            <a:pPr lvl="0" indent="-342900" marL="342900">
+              <a:buAutoNum type="arabicPeriod"/>
+            </a:pPr>
+            <a:r>
+              <a:rPr/>
+              <a:t>Technical Appendices</a:t>
             </a:r>
           </a:p>
         </p:txBody>
@@ -18375,150 +18218,6 @@
 </file>
 
 <file path=ppt/slides/slide5.xml><?xml version="1.0" encoding="utf-8"?>
-<p:sld xmlns:a="http://schemas.openxmlformats.org/drawingml/2006/main" xmlns:r="http://schemas.openxmlformats.org/officeDocument/2006/relationships" xmlns:p="http://schemas.openxmlformats.org/presentationml/2006/main">
-  <p:cSld>
-    <p:spTree>
-      <p:nvGrpSpPr>
-        <p:cNvPr id="1" name=""/>
-        <p:cNvGrpSpPr/>
-        <p:nvPr/>
-      </p:nvGrpSpPr>
-      <p:grpSpPr>
-        <a:xfrm>
-          <a:off x="0" y="0"/>
-          <a:ext cx="0" cy="0"/>
-          <a:chOff x="0" y="0"/>
-          <a:chExt cx="0" cy="0"/>
-        </a:xfrm>
-      </p:grpSpPr>
-      <p:sp>
-        <p:nvSpPr>
-          <p:cNvPr id="2" name="Title 1"/>
-          <p:cNvSpPr>
-            <a:spLocks noGrp="1"/>
-          </p:cNvSpPr>
-          <p:nvPr>
-            <p:ph type="title"/>
-          </p:nvPr>
-        </p:nvSpPr>
-        <p:spPr/>
-        <p:txBody>
-          <a:bodyPr/>
-          <a:lstStyle/>
-          <a:p>
-            <a:pPr lvl="0" indent="0" marL="0">
-              <a:buNone/>
-            </a:pPr>
-            <a:r>
-              <a:rPr/>
-              <a:t>Table of Contents</a:t>
-            </a:r>
-          </a:p>
-        </p:txBody>
-      </p:sp>
-      <p:sp>
-        <p:nvSpPr>
-          <p:cNvPr id="3" name="Content Placeholder 2"/>
-          <p:cNvSpPr>
-            <a:spLocks noGrp="1"/>
-          </p:cNvSpPr>
-          <p:nvPr>
-            <p:ph idx="1"/>
-          </p:nvPr>
-        </p:nvSpPr>
-        <p:spPr/>
-        <p:txBody>
-          <a:bodyPr/>
-          <a:lstStyle/>
-          <a:p>
-            <a:pPr lvl="0" indent="-342900" marL="342900">
-              <a:buAutoNum type="arabicPeriod"/>
-            </a:pPr>
-            <a:r>
-              <a:rPr/>
-              <a:t>Problem Analysis</a:t>
-            </a:r>
-          </a:p>
-          <a:p>
-            <a:pPr lvl="0" indent="-342900" marL="342900">
-              <a:buAutoNum type="arabicPeriod"/>
-            </a:pPr>
-            <a:r>
-              <a:rPr/>
-              <a:t>Implementation Journey</a:t>
-            </a:r>
-          </a:p>
-          <a:p>
-            <a:pPr lvl="0" indent="-342900" marL="342900">
-              <a:buAutoNum type="arabicPeriod"/>
-            </a:pPr>
-            <a:r>
-              <a:rPr/>
-              <a:t>Mathematical Foundations</a:t>
-            </a:r>
-          </a:p>
-          <a:p>
-            <a:pPr lvl="0" indent="-342900" marL="342900">
-              <a:buAutoNum type="arabicPeriod"/>
-            </a:pPr>
-            <a:r>
-              <a:rPr/>
-              <a:t>Robot Motion Planning</a:t>
-            </a:r>
-          </a:p>
-          <a:p>
-            <a:pPr lvl="0" indent="-342900" marL="342900">
-              <a:buAutoNum type="arabicPeriod"/>
-            </a:pPr>
-            <a:r>
-              <a:rPr/>
-              <a:t>Performance Analysis</a:t>
-            </a:r>
-          </a:p>
-          <a:p>
-            <a:pPr lvl="0" indent="-342900" marL="342900">
-              <a:buAutoNum type="arabicPeriod"/>
-            </a:pPr>
-            <a:r>
-              <a:rPr/>
-              <a:t>Testing and Validation</a:t>
-            </a:r>
-          </a:p>
-          <a:p>
-            <a:pPr lvl="0" indent="-342900" marL="342900">
-              <a:buAutoNum type="arabicPeriod"/>
-            </a:pPr>
-            <a:r>
-              <a:rPr/>
-              <a:t>Visual Documentation</a:t>
-            </a:r>
-          </a:p>
-          <a:p>
-            <a:pPr lvl="0" indent="-342900" marL="342900">
-              <a:buAutoNum type="arabicPeriod"/>
-            </a:pPr>
-            <a:r>
-              <a:rPr/>
-              <a:t>Conclusions and Impact</a:t>
-            </a:r>
-          </a:p>
-          <a:p>
-            <a:pPr lvl="0" indent="-342900" marL="342900">
-              <a:buAutoNum type="arabicPeriod"/>
-            </a:pPr>
-            <a:r>
-              <a:rPr/>
-              <a:t>Technical Appendices</a:t>
-            </a:r>
-          </a:p>
-        </p:txBody>
-      </p:sp>
-    </p:spTree>
-  </p:cSld>
-</p:sld>
-</file>
-
-<file path=ppt/slides/slide6.xml><?xml version="1.0" encoding="utf-8"?>
 <p:sld xmlns:a="http://schemas.openxmlformats.org/drawingml/2006/main" xmlns:r="http://schemas.openxmlformats.org/officeDocument/2006/relationships" xmlns:p="http://schemas.openxmlformats.org/presentationml/2006/main">
   <p:cSld>
     <p:spTree>
@@ -18669,7 +18368,7 @@
 </p:sld>
 </file>
 
-<file path=ppt/slides/slide7.xml><?xml version="1.0" encoding="utf-8"?>
+<file path=ppt/slides/slide6.xml><?xml version="1.0" encoding="utf-8"?>
 <p:sld xmlns:a="http://schemas.openxmlformats.org/drawingml/2006/main" xmlns:r="http://schemas.openxmlformats.org/officeDocument/2006/relationships" xmlns:p="http://schemas.openxmlformats.org/presentationml/2006/main">
   <p:cSld>
     <p:spTree>
@@ -19028,7 +18727,7 @@
 </p:sld>
 </file>
 
-<file path=ppt/slides/slide8.xml><?xml version="1.0" encoding="utf-8"?>
+<file path=ppt/slides/slide7.xml><?xml version="1.0" encoding="utf-8"?>
 <p:sld xmlns:a="http://schemas.openxmlformats.org/drawingml/2006/main" xmlns:r="http://schemas.openxmlformats.org/officeDocument/2006/relationships" xmlns:p="http://schemas.openxmlformats.org/presentationml/2006/main">
   <p:cSld>
     <p:spTree>
@@ -20939,7 +20638,7 @@
 </p:sld>
 </file>
 
-<file path=ppt/slides/slide9.xml><?xml version="1.0" encoding="utf-8"?>
+<file path=ppt/slides/slide8.xml><?xml version="1.0" encoding="utf-8"?>
 <p:sld xmlns:a="http://schemas.openxmlformats.org/drawingml/2006/main" xmlns:r="http://schemas.openxmlformats.org/officeDocument/2006/relationships" xmlns:p="http://schemas.openxmlformats.org/presentationml/2006/main">
   <p:cSld>
     <p:spTree>
@@ -21085,6 +20784,287 @@
             <a:r>
               <a:rPr/>
               <a:t>Figure 3: Comprehensive Test Results</a:t>
+            </a:r>
+          </a:p>
+        </p:txBody>
+      </p:sp>
+    </p:spTree>
+  </p:cSld>
+</p:sld>
+</file>
+
+<file path=ppt/slides/slide9.xml><?xml version="1.0" encoding="utf-8"?>
+<p:sld xmlns:a="http://schemas.openxmlformats.org/drawingml/2006/main" xmlns:r="http://schemas.openxmlformats.org/officeDocument/2006/relationships" xmlns:p="http://schemas.openxmlformats.org/presentationml/2006/main">
+  <p:cSld>
+    <p:spTree>
+      <p:nvGrpSpPr>
+        <p:cNvPr id="1" name=""/>
+        <p:cNvGrpSpPr/>
+        <p:nvPr/>
+      </p:nvGrpSpPr>
+      <p:grpSpPr>
+        <a:xfrm>
+          <a:off x="0" y="0"/>
+          <a:ext cx="0" cy="0"/>
+          <a:chOff x="0" y="0"/>
+          <a:chExt cx="0" cy="0"/>
+        </a:xfrm>
+      </p:grpSpPr>
+      <p:sp>
+        <p:nvSpPr>
+          <p:cNvPr id="4" name="Text Placeholder 3"/>
+          <p:cNvSpPr>
+            <a:spLocks noGrp="1"/>
+          </p:cNvSpPr>
+          <p:nvPr>
+            <p:ph idx="2" sz="half" type="body"/>
+          </p:nvPr>
+        </p:nvSpPr>
+        <p:spPr/>
+        <p:txBody>
+          <a:bodyPr/>
+          <a:lstStyle/>
+          <a:p>
+            <a:pPr lvl="0" indent="0" marL="0">
+              <a:buNone/>
+            </a:pPr>
+            <a:r>
+              <a:rPr/>
+              <a:t> </a:t>
+            </a:r>
+            <a:r>
+              <a:rPr b="1"/>
+              <a:t>Figure 3</a:t>
+            </a:r>
+            <a:r>
+              <a:rPr/>
+              <a:t>: </a:t>
+            </a:r>
+            <a:r>
+              <a:rPr i="1"/>
+              <a:t>Complete test suite showing 100% pass rate. All mathematical properties verified: identity quaternion, 90° rotations, robot-specific quaternions, and unnormalized inputs all handled correctly.</a:t>
+            </a:r>
+          </a:p>
+          <a:p>
+            <a:pPr lvl="0" indent="0" marL="0">
+              <a:buNone/>
+            </a:pPr>
+            <a:r>
+              <a:rPr b="1"/>
+              <a:t>Test Coverage:</a:t>
+            </a:r>
+            <a:r>
+              <a:rPr/>
+              <a:t> - ✅ Identity quaternion: [1,0,0,0] → I₃ - ✅ 90° Z-rotation: Verified against known result - ✅ Robot quaternions: From actual RAPID targets - ✅ Unnormalized inputs: Automatic normalization - ✅ Determinant validation: det(R) = 1.0 ± 10⁻¹⁶ - ✅ Orthogonality: R’R = I within machine precision</a:t>
+            </a:r>
+          </a:p>
+          <a:p>
+            <a:pPr lvl="0" indent="0" marL="0">
+              <a:spcBef>
+                <a:spcPts val="3000"/>
+              </a:spcBef>
+              <a:buNone/>
+            </a:pPr>
+            <a:r>
+              <a:rPr b="1"/>
+              <a:t>2.2 Phase 2: SLERP Interpolation</a:t>
+            </a:r>
+          </a:p>
+          <a:p>
+            <a:pPr lvl="0" indent="0" marL="0">
+              <a:spcBef>
+                <a:spcPts val="3000"/>
+              </a:spcBef>
+              <a:buNone/>
+            </a:pPr>
+            <a:r>
+              <a:rPr b="1"/>
+              <a:t>2.2.1 Why SLERP Matters</a:t>
+            </a:r>
+          </a:p>
+          <a:p>
+            <a:pPr lvl="0" indent="0" marL="0">
+              <a:buNone/>
+            </a:pPr>
+            <a:r>
+              <a:rPr/>
+              <a:t>Linear interpolation of quaternions causes: - </a:t>
+            </a:r>
+            <a:r>
+              <a:rPr b="1"/>
+              <a:t>Non-constant angular velocity</a:t>
+            </a:r>
+            <a:r>
+              <a:rPr/>
+              <a:t> (jerky motion) - </a:t>
+            </a:r>
+            <a:r>
+              <a:rPr b="1"/>
+              <a:t>Unnatural paths</a:t>
+            </a:r>
+            <a:r>
+              <a:rPr/>
+              <a:t> (deviation from geodesic) - </a:t>
+            </a:r>
+            <a:r>
+              <a:rPr b="1"/>
+              <a:t>Quaternion denormalization</a:t>
+            </a:r>
+            <a:r>
+              <a:rPr/>
+              <a:t> (invalid rotations)</a:t>
+            </a:r>
+          </a:p>
+          <a:p>
+            <a:pPr lvl="0" indent="0" marL="0">
+              <a:buNone/>
+            </a:pPr>
+            <a:r>
+              <a:rPr/>
+              <a:t>Spherical Linear Interpolation (SLERP) provides: - </a:t>
+            </a:r>
+            <a:r>
+              <a:rPr b="1"/>
+              <a:t>Constant angular velocity</a:t>
+            </a:r>
+            <a:r>
+              <a:rPr/>
+              <a:t> (smooth motion) - </a:t>
+            </a:r>
+            <a:r>
+              <a:rPr b="1"/>
+              <a:t>Shortest path</a:t>
+            </a:r>
+            <a:r>
+              <a:rPr/>
+              <a:t> on the quaternion sphere - </a:t>
+            </a:r>
+            <a:r>
+              <a:rPr b="1"/>
+              <a:t>Preserved normalization</a:t>
+            </a:r>
+            <a:r>
+              <a:rPr/>
+              <a:t> (always unit quaternion)</a:t>
+            </a:r>
+          </a:p>
+          <a:p>
+            <a:pPr lvl="0" indent="0" marL="0">
+              <a:spcBef>
+                <a:spcPts val="3000"/>
+              </a:spcBef>
+              <a:buNone/>
+            </a:pPr>
+            <a:r>
+              <a:rPr b="1"/>
+              <a:t>2.2.2 SLERP Mathematics</a:t>
+            </a:r>
+          </a:p>
+          <a:p>
+            <a:pPr lvl="0" indent="0" marL="0">
+              <a:buNone/>
+            </a:pPr>
+            <a:r>
+              <a:rPr/>
+              <a:t>Given two unit quaternions </a:t>
+            </a:r>
+            <a:r>
+              <a:rPr b="1"/>
+              <a:t>q₁</a:t>
+            </a:r>
+            <a:r>
+              <a:rPr/>
+              <a:t> and </a:t>
+            </a:r>
+            <a:r>
+              <a:rPr b="1"/>
+              <a:t>q₂</a:t>
+            </a:r>
+            <a:r>
+              <a:rPr/>
+              <a:t>, SLERP interpolates as:</a:t>
+            </a:r>
+          </a:p>
+          <a:p>
+            <a:pPr lvl="0" indent="0">
+              <a:buNone/>
+            </a:pPr>
+            <a:r>
+              <a:rPr>
+                <a:latin typeface="Courier"/>
+              </a:rPr>
+              <a:t>SLERP(q₁, q₂, t) = [sin((1-t)θ)/sin(θ)] × q₁ + [sin(tθ)/sin(θ)] × q₂</a:t>
+            </a:r>
+          </a:p>
+          <a:p>
+            <a:pPr lvl="0" indent="0" marL="0">
+              <a:buNone/>
+            </a:pPr>
+            <a:r>
+              <a:rPr/>
+              <a:t>where θ = arccos(q₁ · q₂) is the angle between quaternions.</a:t>
+            </a:r>
+          </a:p>
+        </p:txBody>
+      </p:sp>
+      <p:pic>
+        <p:nvPicPr>
+          <p:cNvPr descr="figures/fig5_slerp_comparison.png" id="0" name="Picture 1"/>
+          <p:cNvPicPr>
+            <a:picLocks noGrp="1" noChangeAspect="1"/>
+          </p:cNvPicPr>
+          <p:nvPr/>
+        </p:nvPicPr>
+        <p:blipFill>
+          <a:blip r:embed="rId2"/>
+          <a:stretch>
+            <a:fillRect/>
+          </a:stretch>
+        </p:blipFill>
+        <p:spPr bwMode="auto">
+          <a:xfrm>
+            <a:off x="3632200" y="203200"/>
+            <a:ext cx="4978400" cy="3873500"/>
+          </a:xfrm>
+          <a:prstGeom prst="rect">
+            <a:avLst/>
+          </a:prstGeom>
+          <a:noFill/>
+          <a:ln w="9525">
+            <a:noFill/>
+            <a:headEnd/>
+            <a:tailEnd/>
+          </a:ln>
+        </p:spPr>
+      </p:pic>
+      <p:sp>
+        <p:nvSpPr>
+          <p:cNvPr id="1" name="TextBox 3"/>
+          <p:cNvSpPr txBox="1"/>
+          <p:nvPr>
+            <p:ph idx="1"/>
+          </p:nvPr>
+        </p:nvSpPr>
+        <p:spPr>
+          <a:xfrm>
+            <a:off x="3568700" y="4076700"/>
+            <a:ext cx="5105400" cy="508000"/>
+          </a:xfrm>
+          <a:prstGeom prst="rect">
+            <a:avLst/>
+          </a:prstGeom>
+          <a:noFill/>
+        </p:spPr>
+        <p:txBody>
+          <a:bodyPr/>
+          <a:lstStyle/>
+          <a:p>
+            <a:pPr lvl="0" indent="0" marL="0" algn="ctr">
+              <a:buNone/>
+            </a:pPr>
+            <a:r>
+              <a:rPr/>
+              <a:t>Figure 5: SLERP vs Linear Interpolation Comparison</a:t>
             </a:r>
           </a:p>
         </p:txBody>

</xml_diff>

<commit_message>
Remove repository references and add MATLAB Online shared link
</commit_message>
<xml_diff>
--- a/FINAL_PRESENTATION.pptx
+++ b/FINAL_PRESENTATION.pptx
@@ -35,7 +35,6 @@
     <p:sldId id="283" r:id="rId29"/>
     <p:sldId id="284" r:id="rId30"/>
     <p:sldId id="285" r:id="rId31"/>
-    <p:sldId id="286" r:id="rId32"/>
   </p:sldIdLst>
   <p:sldSz cx="9144000" cy="5143500" type="screen16x9"/>
   <p:notesSz cx="6858000" cy="9144000"/>
@@ -11757,14 +11756,18 @@
               <a:rPr/>
               <a:t>: RMB600 Mini Project - ABB IRB1600 Robot Simulation</a:t>
             </a:r>
-            <a:br/>
+          </a:p>
+          <a:p>
+            <a:pPr lvl="0" indent="0" marL="0">
+              <a:buNone/>
+            </a:pPr>
             <a:r>
               <a:rPr b="1"/>
-              <a:t>Repository</a:t>
-            </a:r>
-            <a:r>
-              <a:rPr/>
-              <a:t>: github.com/abhi-mdu/RMB600_mini_project</a:t>
+              <a:t>MATLAB Online Access</a:t>
+            </a:r>
+            <a:r>
+              <a:rPr/>
+              <a:t>: https://drive.mathworks.com/sharing/6aab9a91-d00f-461e-b031-61f1169b1f2d</a:t>
             </a:r>
           </a:p>
         </p:txBody>
@@ -17363,67 +17366,6 @@
               <a:t>.</a:t>
             </a:r>
           </a:p>
-          <a:p>
-            <a:pPr lvl="0" indent="0" marL="0">
-              <a:spcBef>
-                <a:spcPts val="3000"/>
-              </a:spcBef>
-              <a:buNone/>
-            </a:pPr>
-            <a:r>
-              <a:rPr b="1"/>
-              <a:t>9.5 Contact and Support</a:t>
-            </a:r>
-          </a:p>
-          <a:p>
-            <a:pPr lvl="0" indent="0" marL="0">
-              <a:buNone/>
-            </a:pPr>
-            <a:r>
-              <a:rPr b="1"/>
-              <a:t>Project Repository</a:t>
-            </a:r>
-            <a:r>
-              <a:rPr/>
-              <a:t>: github.com/abhi-mdu/RMB600_mini_project</a:t>
-            </a:r>
-            <a:br/>
-            <a:r>
-              <a:rPr b="1"/>
-              <a:t>Course</a:t>
-            </a:r>
-            <a:r>
-              <a:rPr/>
-              <a:t>: RMB600 - Advanced Robotics</a:t>
-            </a:r>
-            <a:br/>
-            <a:r>
-              <a:rPr b="1"/>
-              <a:t>Institution</a:t>
-            </a:r>
-            <a:r>
-              <a:rPr/>
-              <a:t>: Masters Program in Robotics</a:t>
-            </a:r>
-            <a:br/>
-            <a:r>
-              <a:rPr b="1"/>
-              <a:t>Date</a:t>
-            </a:r>
-            <a:r>
-              <a:rPr/>
-              <a:t>: January 2026</a:t>
-            </a:r>
-          </a:p>
-          <a:p>
-            <a:pPr lvl="0" indent="0" marL="0">
-              <a:buNone/>
-            </a:pPr>
-            <a:r>
-              <a:rPr/>
-              <a:t>For questions or issues, please open a GitHub issue or contact through the course portal.</a:t>
-            </a:r>
-          </a:p>
         </p:txBody>
       </p:sp>
     </p:spTree>
@@ -17928,105 +17870,6 @@
 </file>
 
 <file path=ppt/slides/slide30.xml><?xml version="1.0" encoding="utf-8"?>
-<p:sld xmlns:a="http://schemas.openxmlformats.org/drawingml/2006/main" xmlns:r="http://schemas.openxmlformats.org/officeDocument/2006/relationships" xmlns:p="http://schemas.openxmlformats.org/presentationml/2006/main">
-  <p:cSld>
-    <p:spTree>
-      <p:nvGrpSpPr>
-        <p:cNvPr id="1" name=""/>
-        <p:cNvGrpSpPr/>
-        <p:nvPr/>
-      </p:nvGrpSpPr>
-      <p:grpSpPr>
-        <a:xfrm>
-          <a:off x="0" y="0"/>
-          <a:ext cx="0" cy="0"/>
-          <a:chOff x="0" y="0"/>
-          <a:chExt cx="0" cy="0"/>
-        </a:xfrm>
-      </p:grpSpPr>
-      <p:sp>
-        <p:nvSpPr>
-          <p:cNvPr id="3" name="Content Placeholder 2"/>
-          <p:cNvSpPr>
-            <a:spLocks noGrp="1"/>
-          </p:cNvSpPr>
-          <p:nvPr>
-            <p:ph idx="1"/>
-          </p:nvPr>
-        </p:nvSpPr>
-        <p:spPr/>
-        <p:txBody>
-          <a:bodyPr/>
-          <a:lstStyle/>
-          <a:p>
-            <a:pPr lvl="0" indent="0" marL="0">
-              <a:buNone/>
-            </a:pPr>
-            <a:r>
-              <a:rPr b="1"/>
-              <a:t>Document Information:</a:t>
-            </a:r>
-            <a:r>
-              <a:rPr/>
-              <a:t> - </a:t>
-            </a:r>
-            <a:r>
-              <a:rPr b="1"/>
-              <a:t>Version</a:t>
-            </a:r>
-            <a:r>
-              <a:rPr/>
-              <a:t>: 2.0 (Final - Complete) - </a:t>
-            </a:r>
-            <a:r>
-              <a:rPr b="1"/>
-              <a:t>Generated</a:t>
-            </a:r>
-            <a:r>
-              <a:rPr/>
-              <a:t>: January 15, 2026 - </a:t>
-            </a:r>
-            <a:r>
-              <a:rPr b="1"/>
-              <a:t>Format</a:t>
-            </a:r>
-            <a:r>
-              <a:rPr/>
-              <a:t>: Markdown with embedded PNG figures - </a:t>
-            </a:r>
-            <a:r>
-              <a:rPr b="1"/>
-              <a:t>Page Count</a:t>
-            </a:r>
-            <a:r>
-              <a:rPr/>
-              <a:t>: ~50 pages (when rendered to PDF) - </a:t>
-            </a:r>
-            <a:r>
-              <a:rPr b="1"/>
-              <a:t>Word Count</a:t>
-            </a:r>
-            <a:r>
-              <a:rPr/>
-              <a:t>: ~13,000 words - </a:t>
-            </a:r>
-            <a:r>
-              <a:rPr b="1"/>
-              <a:t>Figure Count</a:t>
-            </a:r>
-            <a:r>
-              <a:rPr/>
-              <a:t>: 10 high-resolution PNG images (complete set)</a:t>
-            </a:r>
-          </a:p>
-        </p:txBody>
-      </p:sp>
-    </p:spTree>
-  </p:cSld>
-</p:sld>
-</file>
-
-<file path=ppt/slides/slide31.xml><?xml version="1.0" encoding="utf-8"?>
 <p:sld xmlns:a="http://schemas.openxmlformats.org/drawingml/2006/main" xmlns:r="http://schemas.openxmlformats.org/officeDocument/2006/relationships" xmlns:p="http://schemas.openxmlformats.org/presentationml/2006/main">
   <p:cSld>
     <p:spTree>

</xml_diff>